<commit_message>
Modification des schémas d'architecture
</commit_message>
<xml_diff>
--- a/schemas_architecture_materielle.pptx
+++ b/schemas_architecture_materielle.pptx
@@ -155,10 +155,9 @@
           </a:lstStyle>
           <a:p>
             <a:r>
-              <a:rPr lang="fr-FR" smtClean="0"/>
+              <a:rPr lang="fr-FR"/>
               <a:t>Modifiez le style du titre</a:t>
             </a:r>
-            <a:endParaRPr lang="fr-FR"/>
           </a:p>
         </p:txBody>
       </p:sp>
@@ -220,10 +219,9 @@
           </a:lstStyle>
           <a:p>
             <a:r>
-              <a:rPr lang="fr-FR" smtClean="0"/>
+              <a:rPr lang="fr-FR"/>
               <a:t>Modifier le style des sous-titres du masque</a:t>
             </a:r>
-            <a:endParaRPr lang="fr-FR"/>
           </a:p>
         </p:txBody>
       </p:sp>
@@ -244,7 +242,7 @@
           <a:p>
             <a:fld id="{967AB95B-CF6F-43FD-8F6D-069006E4CBA5}" type="datetimeFigureOut">
               <a:rPr lang="fr-FR" smtClean="0"/>
-              <a:t>13/03/2020</a:t>
+              <a:t>20/03/2020</a:t>
             </a:fld>
             <a:endParaRPr lang="fr-FR"/>
           </a:p>
@@ -338,10 +336,9 @@
           <a:lstStyle/>
           <a:p>
             <a:r>
-              <a:rPr lang="fr-FR" smtClean="0"/>
+              <a:rPr lang="fr-FR"/>
               <a:t>Modifiez le style du titre</a:t>
             </a:r>
-            <a:endParaRPr lang="fr-FR"/>
           </a:p>
         </p:txBody>
       </p:sp>
@@ -362,38 +359,37 @@
           <a:p>
             <a:pPr lvl="0"/>
             <a:r>
-              <a:rPr lang="fr-FR" smtClean="0"/>
+              <a:rPr lang="fr-FR"/>
               <a:t>Modifier les styles du texte du masque</a:t>
             </a:r>
           </a:p>
           <a:p>
             <a:pPr lvl="1"/>
             <a:r>
-              <a:rPr lang="fr-FR" smtClean="0"/>
+              <a:rPr lang="fr-FR"/>
               <a:t>Deuxième niveau</a:t>
             </a:r>
           </a:p>
           <a:p>
             <a:pPr lvl="2"/>
             <a:r>
-              <a:rPr lang="fr-FR" smtClean="0"/>
+              <a:rPr lang="fr-FR"/>
               <a:t>Troisième niveau</a:t>
             </a:r>
           </a:p>
           <a:p>
             <a:pPr lvl="3"/>
             <a:r>
-              <a:rPr lang="fr-FR" smtClean="0"/>
+              <a:rPr lang="fr-FR"/>
               <a:t>Quatrième niveau</a:t>
             </a:r>
           </a:p>
           <a:p>
             <a:pPr lvl="4"/>
             <a:r>
-              <a:rPr lang="fr-FR" smtClean="0"/>
+              <a:rPr lang="fr-FR"/>
               <a:t>Cinquième niveau</a:t>
             </a:r>
-            <a:endParaRPr lang="fr-FR"/>
           </a:p>
         </p:txBody>
       </p:sp>
@@ -414,7 +410,7 @@
           <a:p>
             <a:fld id="{967AB95B-CF6F-43FD-8F6D-069006E4CBA5}" type="datetimeFigureOut">
               <a:rPr lang="fr-FR" smtClean="0"/>
-              <a:t>13/03/2020</a:t>
+              <a:t>20/03/2020</a:t>
             </a:fld>
             <a:endParaRPr lang="fr-FR"/>
           </a:p>
@@ -513,10 +509,9 @@
           <a:lstStyle/>
           <a:p>
             <a:r>
-              <a:rPr lang="fr-FR" smtClean="0"/>
+              <a:rPr lang="fr-FR"/>
               <a:t>Modifiez le style du titre</a:t>
             </a:r>
-            <a:endParaRPr lang="fr-FR"/>
           </a:p>
         </p:txBody>
       </p:sp>
@@ -542,38 +537,37 @@
           <a:p>
             <a:pPr lvl="0"/>
             <a:r>
-              <a:rPr lang="fr-FR" smtClean="0"/>
+              <a:rPr lang="fr-FR"/>
               <a:t>Modifier les styles du texte du masque</a:t>
             </a:r>
           </a:p>
           <a:p>
             <a:pPr lvl="1"/>
             <a:r>
-              <a:rPr lang="fr-FR" smtClean="0"/>
+              <a:rPr lang="fr-FR"/>
               <a:t>Deuxième niveau</a:t>
             </a:r>
           </a:p>
           <a:p>
             <a:pPr lvl="2"/>
             <a:r>
-              <a:rPr lang="fr-FR" smtClean="0"/>
+              <a:rPr lang="fr-FR"/>
               <a:t>Troisième niveau</a:t>
             </a:r>
           </a:p>
           <a:p>
             <a:pPr lvl="3"/>
             <a:r>
-              <a:rPr lang="fr-FR" smtClean="0"/>
+              <a:rPr lang="fr-FR"/>
               <a:t>Quatrième niveau</a:t>
             </a:r>
           </a:p>
           <a:p>
             <a:pPr lvl="4"/>
             <a:r>
-              <a:rPr lang="fr-FR" smtClean="0"/>
+              <a:rPr lang="fr-FR"/>
               <a:t>Cinquième niveau</a:t>
             </a:r>
-            <a:endParaRPr lang="fr-FR"/>
           </a:p>
         </p:txBody>
       </p:sp>
@@ -594,7 +588,7 @@
           <a:p>
             <a:fld id="{967AB95B-CF6F-43FD-8F6D-069006E4CBA5}" type="datetimeFigureOut">
               <a:rPr lang="fr-FR" smtClean="0"/>
-              <a:t>13/03/2020</a:t>
+              <a:t>20/03/2020</a:t>
             </a:fld>
             <a:endParaRPr lang="fr-FR"/>
           </a:p>
@@ -688,10 +682,9 @@
           <a:lstStyle/>
           <a:p>
             <a:r>
-              <a:rPr lang="fr-FR" smtClean="0"/>
+              <a:rPr lang="fr-FR"/>
               <a:t>Modifiez le style du titre</a:t>
             </a:r>
-            <a:endParaRPr lang="fr-FR"/>
           </a:p>
         </p:txBody>
       </p:sp>
@@ -712,38 +705,37 @@
           <a:p>
             <a:pPr lvl="0"/>
             <a:r>
-              <a:rPr lang="fr-FR" smtClean="0"/>
+              <a:rPr lang="fr-FR"/>
               <a:t>Modifier les styles du texte du masque</a:t>
             </a:r>
           </a:p>
           <a:p>
             <a:pPr lvl="1"/>
             <a:r>
-              <a:rPr lang="fr-FR" smtClean="0"/>
+              <a:rPr lang="fr-FR"/>
               <a:t>Deuxième niveau</a:t>
             </a:r>
           </a:p>
           <a:p>
             <a:pPr lvl="2"/>
             <a:r>
-              <a:rPr lang="fr-FR" smtClean="0"/>
+              <a:rPr lang="fr-FR"/>
               <a:t>Troisième niveau</a:t>
             </a:r>
           </a:p>
           <a:p>
             <a:pPr lvl="3"/>
             <a:r>
-              <a:rPr lang="fr-FR" smtClean="0"/>
+              <a:rPr lang="fr-FR"/>
               <a:t>Quatrième niveau</a:t>
             </a:r>
           </a:p>
           <a:p>
             <a:pPr lvl="4"/>
             <a:r>
-              <a:rPr lang="fr-FR" smtClean="0"/>
+              <a:rPr lang="fr-FR"/>
               <a:t>Cinquième niveau</a:t>
             </a:r>
-            <a:endParaRPr lang="fr-FR"/>
           </a:p>
         </p:txBody>
       </p:sp>
@@ -764,7 +756,7 @@
           <a:p>
             <a:fld id="{967AB95B-CF6F-43FD-8F6D-069006E4CBA5}" type="datetimeFigureOut">
               <a:rPr lang="fr-FR" smtClean="0"/>
-              <a:t>13/03/2020</a:t>
+              <a:t>20/03/2020</a:t>
             </a:fld>
             <a:endParaRPr lang="fr-FR"/>
           </a:p>
@@ -867,10 +859,9 @@
           </a:lstStyle>
           <a:p>
             <a:r>
-              <a:rPr lang="fr-FR" smtClean="0"/>
+              <a:rPr lang="fr-FR"/>
               <a:t>Modifiez le style du titre</a:t>
             </a:r>
-            <a:endParaRPr lang="fr-FR"/>
           </a:p>
         </p:txBody>
       </p:sp>
@@ -987,7 +978,7 @@
           <a:p>
             <a:pPr lvl="0"/>
             <a:r>
-              <a:rPr lang="fr-FR" smtClean="0"/>
+              <a:rPr lang="fr-FR"/>
               <a:t>Modifier les styles du texte du masque</a:t>
             </a:r>
           </a:p>
@@ -1010,7 +1001,7 @@
           <a:p>
             <a:fld id="{967AB95B-CF6F-43FD-8F6D-069006E4CBA5}" type="datetimeFigureOut">
               <a:rPr lang="fr-FR" smtClean="0"/>
-              <a:t>13/03/2020</a:t>
+              <a:t>20/03/2020</a:t>
             </a:fld>
             <a:endParaRPr lang="fr-FR"/>
           </a:p>
@@ -1104,10 +1095,9 @@
           <a:lstStyle/>
           <a:p>
             <a:r>
-              <a:rPr lang="fr-FR" smtClean="0"/>
+              <a:rPr lang="fr-FR"/>
               <a:t>Modifiez le style du titre</a:t>
             </a:r>
-            <a:endParaRPr lang="fr-FR"/>
           </a:p>
         </p:txBody>
       </p:sp>
@@ -1133,38 +1123,37 @@
           <a:p>
             <a:pPr lvl="0"/>
             <a:r>
-              <a:rPr lang="fr-FR" smtClean="0"/>
+              <a:rPr lang="fr-FR"/>
               <a:t>Modifier les styles du texte du masque</a:t>
             </a:r>
           </a:p>
           <a:p>
             <a:pPr lvl="1"/>
             <a:r>
-              <a:rPr lang="fr-FR" smtClean="0"/>
+              <a:rPr lang="fr-FR"/>
               <a:t>Deuxième niveau</a:t>
             </a:r>
           </a:p>
           <a:p>
             <a:pPr lvl="2"/>
             <a:r>
-              <a:rPr lang="fr-FR" smtClean="0"/>
+              <a:rPr lang="fr-FR"/>
               <a:t>Troisième niveau</a:t>
             </a:r>
           </a:p>
           <a:p>
             <a:pPr lvl="3"/>
             <a:r>
-              <a:rPr lang="fr-FR" smtClean="0"/>
+              <a:rPr lang="fr-FR"/>
               <a:t>Quatrième niveau</a:t>
             </a:r>
           </a:p>
           <a:p>
             <a:pPr lvl="4"/>
             <a:r>
-              <a:rPr lang="fr-FR" smtClean="0"/>
+              <a:rPr lang="fr-FR"/>
               <a:t>Cinquième niveau</a:t>
             </a:r>
-            <a:endParaRPr lang="fr-FR"/>
           </a:p>
         </p:txBody>
       </p:sp>
@@ -1190,38 +1179,37 @@
           <a:p>
             <a:pPr lvl="0"/>
             <a:r>
-              <a:rPr lang="fr-FR" smtClean="0"/>
+              <a:rPr lang="fr-FR"/>
               <a:t>Modifier les styles du texte du masque</a:t>
             </a:r>
           </a:p>
           <a:p>
             <a:pPr lvl="1"/>
             <a:r>
-              <a:rPr lang="fr-FR" smtClean="0"/>
+              <a:rPr lang="fr-FR"/>
               <a:t>Deuxième niveau</a:t>
             </a:r>
           </a:p>
           <a:p>
             <a:pPr lvl="2"/>
             <a:r>
-              <a:rPr lang="fr-FR" smtClean="0"/>
+              <a:rPr lang="fr-FR"/>
               <a:t>Troisième niveau</a:t>
             </a:r>
           </a:p>
           <a:p>
             <a:pPr lvl="3"/>
             <a:r>
-              <a:rPr lang="fr-FR" smtClean="0"/>
+              <a:rPr lang="fr-FR"/>
               <a:t>Quatrième niveau</a:t>
             </a:r>
           </a:p>
           <a:p>
             <a:pPr lvl="4"/>
             <a:r>
-              <a:rPr lang="fr-FR" smtClean="0"/>
+              <a:rPr lang="fr-FR"/>
               <a:t>Cinquième niveau</a:t>
             </a:r>
-            <a:endParaRPr lang="fr-FR"/>
           </a:p>
         </p:txBody>
       </p:sp>
@@ -1242,7 +1230,7 @@
           <a:p>
             <a:fld id="{967AB95B-CF6F-43FD-8F6D-069006E4CBA5}" type="datetimeFigureOut">
               <a:rPr lang="fr-FR" smtClean="0"/>
-              <a:t>13/03/2020</a:t>
+              <a:t>20/03/2020</a:t>
             </a:fld>
             <a:endParaRPr lang="fr-FR"/>
           </a:p>
@@ -1341,10 +1329,9 @@
           <a:lstStyle/>
           <a:p>
             <a:r>
-              <a:rPr lang="fr-FR" smtClean="0"/>
+              <a:rPr lang="fr-FR"/>
               <a:t>Modifiez le style du titre</a:t>
             </a:r>
-            <a:endParaRPr lang="fr-FR"/>
           </a:p>
         </p:txBody>
       </p:sp>
@@ -1407,7 +1394,7 @@
           <a:p>
             <a:pPr lvl="0"/>
             <a:r>
-              <a:rPr lang="fr-FR" smtClean="0"/>
+              <a:rPr lang="fr-FR"/>
               <a:t>Modifier les styles du texte du masque</a:t>
             </a:r>
           </a:p>
@@ -1435,38 +1422,37 @@
           <a:p>
             <a:pPr lvl="0"/>
             <a:r>
-              <a:rPr lang="fr-FR" smtClean="0"/>
+              <a:rPr lang="fr-FR"/>
               <a:t>Modifier les styles du texte du masque</a:t>
             </a:r>
           </a:p>
           <a:p>
             <a:pPr lvl="1"/>
             <a:r>
-              <a:rPr lang="fr-FR" smtClean="0"/>
+              <a:rPr lang="fr-FR"/>
               <a:t>Deuxième niveau</a:t>
             </a:r>
           </a:p>
           <a:p>
             <a:pPr lvl="2"/>
             <a:r>
-              <a:rPr lang="fr-FR" smtClean="0"/>
+              <a:rPr lang="fr-FR"/>
               <a:t>Troisième niveau</a:t>
             </a:r>
           </a:p>
           <a:p>
             <a:pPr lvl="3"/>
             <a:r>
-              <a:rPr lang="fr-FR" smtClean="0"/>
+              <a:rPr lang="fr-FR"/>
               <a:t>Quatrième niveau</a:t>
             </a:r>
           </a:p>
           <a:p>
             <a:pPr lvl="4"/>
             <a:r>
-              <a:rPr lang="fr-FR" smtClean="0"/>
+              <a:rPr lang="fr-FR"/>
               <a:t>Cinquième niveau</a:t>
             </a:r>
-            <a:endParaRPr lang="fr-FR"/>
           </a:p>
         </p:txBody>
       </p:sp>
@@ -1529,7 +1515,7 @@
           <a:p>
             <a:pPr lvl="0"/>
             <a:r>
-              <a:rPr lang="fr-FR" smtClean="0"/>
+              <a:rPr lang="fr-FR"/>
               <a:t>Modifier les styles du texte du masque</a:t>
             </a:r>
           </a:p>
@@ -1557,38 +1543,37 @@
           <a:p>
             <a:pPr lvl="0"/>
             <a:r>
-              <a:rPr lang="fr-FR" smtClean="0"/>
+              <a:rPr lang="fr-FR"/>
               <a:t>Modifier les styles du texte du masque</a:t>
             </a:r>
           </a:p>
           <a:p>
             <a:pPr lvl="1"/>
             <a:r>
-              <a:rPr lang="fr-FR" smtClean="0"/>
+              <a:rPr lang="fr-FR"/>
               <a:t>Deuxième niveau</a:t>
             </a:r>
           </a:p>
           <a:p>
             <a:pPr lvl="2"/>
             <a:r>
-              <a:rPr lang="fr-FR" smtClean="0"/>
+              <a:rPr lang="fr-FR"/>
               <a:t>Troisième niveau</a:t>
             </a:r>
           </a:p>
           <a:p>
             <a:pPr lvl="3"/>
             <a:r>
-              <a:rPr lang="fr-FR" smtClean="0"/>
+              <a:rPr lang="fr-FR"/>
               <a:t>Quatrième niveau</a:t>
             </a:r>
           </a:p>
           <a:p>
             <a:pPr lvl="4"/>
             <a:r>
-              <a:rPr lang="fr-FR" smtClean="0"/>
+              <a:rPr lang="fr-FR"/>
               <a:t>Cinquième niveau</a:t>
             </a:r>
-            <a:endParaRPr lang="fr-FR"/>
           </a:p>
         </p:txBody>
       </p:sp>
@@ -1609,7 +1594,7 @@
           <a:p>
             <a:fld id="{967AB95B-CF6F-43FD-8F6D-069006E4CBA5}" type="datetimeFigureOut">
               <a:rPr lang="fr-FR" smtClean="0"/>
-              <a:t>13/03/2020</a:t>
+              <a:t>20/03/2020</a:t>
             </a:fld>
             <a:endParaRPr lang="fr-FR"/>
           </a:p>
@@ -1703,10 +1688,9 @@
           <a:lstStyle/>
           <a:p>
             <a:r>
-              <a:rPr lang="fr-FR" smtClean="0"/>
+              <a:rPr lang="fr-FR"/>
               <a:t>Modifiez le style du titre</a:t>
             </a:r>
-            <a:endParaRPr lang="fr-FR"/>
           </a:p>
         </p:txBody>
       </p:sp>
@@ -1727,7 +1711,7 @@
           <a:p>
             <a:fld id="{967AB95B-CF6F-43FD-8F6D-069006E4CBA5}" type="datetimeFigureOut">
               <a:rPr lang="fr-FR" smtClean="0"/>
-              <a:t>13/03/2020</a:t>
+              <a:t>20/03/2020</a:t>
             </a:fld>
             <a:endParaRPr lang="fr-FR"/>
           </a:p>
@@ -1822,7 +1806,7 @@
           <a:p>
             <a:fld id="{967AB95B-CF6F-43FD-8F6D-069006E4CBA5}" type="datetimeFigureOut">
               <a:rPr lang="fr-FR" smtClean="0"/>
-              <a:t>13/03/2020</a:t>
+              <a:t>20/03/2020</a:t>
             </a:fld>
             <a:endParaRPr lang="fr-FR"/>
           </a:p>
@@ -1925,10 +1909,9 @@
           </a:lstStyle>
           <a:p>
             <a:r>
-              <a:rPr lang="fr-FR" smtClean="0"/>
+              <a:rPr lang="fr-FR"/>
               <a:t>Modifiez le style du titre</a:t>
             </a:r>
-            <a:endParaRPr lang="fr-FR"/>
           </a:p>
         </p:txBody>
       </p:sp>
@@ -1982,38 +1965,37 @@
           <a:p>
             <a:pPr lvl="0"/>
             <a:r>
-              <a:rPr lang="fr-FR" smtClean="0"/>
+              <a:rPr lang="fr-FR"/>
               <a:t>Modifier les styles du texte du masque</a:t>
             </a:r>
           </a:p>
           <a:p>
             <a:pPr lvl="1"/>
             <a:r>
-              <a:rPr lang="fr-FR" smtClean="0"/>
+              <a:rPr lang="fr-FR"/>
               <a:t>Deuxième niveau</a:t>
             </a:r>
           </a:p>
           <a:p>
             <a:pPr lvl="2"/>
             <a:r>
-              <a:rPr lang="fr-FR" smtClean="0"/>
+              <a:rPr lang="fr-FR"/>
               <a:t>Troisième niveau</a:t>
             </a:r>
           </a:p>
           <a:p>
             <a:pPr lvl="3"/>
             <a:r>
-              <a:rPr lang="fr-FR" smtClean="0"/>
+              <a:rPr lang="fr-FR"/>
               <a:t>Quatrième niveau</a:t>
             </a:r>
           </a:p>
           <a:p>
             <a:pPr lvl="4"/>
             <a:r>
-              <a:rPr lang="fr-FR" smtClean="0"/>
+              <a:rPr lang="fr-FR"/>
               <a:t>Cinquième niveau</a:t>
             </a:r>
-            <a:endParaRPr lang="fr-FR"/>
           </a:p>
         </p:txBody>
       </p:sp>
@@ -2076,7 +2058,7 @@
           <a:p>
             <a:pPr lvl="0"/>
             <a:r>
-              <a:rPr lang="fr-FR" smtClean="0"/>
+              <a:rPr lang="fr-FR"/>
               <a:t>Modifier les styles du texte du masque</a:t>
             </a:r>
           </a:p>
@@ -2099,7 +2081,7 @@
           <a:p>
             <a:fld id="{967AB95B-CF6F-43FD-8F6D-069006E4CBA5}" type="datetimeFigureOut">
               <a:rPr lang="fr-FR" smtClean="0"/>
-              <a:t>13/03/2020</a:t>
+              <a:t>20/03/2020</a:t>
             </a:fld>
             <a:endParaRPr lang="fr-FR"/>
           </a:p>
@@ -2202,10 +2184,9 @@
           </a:lstStyle>
           <a:p>
             <a:r>
-              <a:rPr lang="fr-FR" smtClean="0"/>
+              <a:rPr lang="fr-FR"/>
               <a:t>Modifiez le style du titre</a:t>
             </a:r>
-            <a:endParaRPr lang="fr-FR"/>
           </a:p>
         </p:txBody>
       </p:sp>
@@ -2329,7 +2310,7 @@
           <a:p>
             <a:pPr lvl="0"/>
             <a:r>
-              <a:rPr lang="fr-FR" smtClean="0"/>
+              <a:rPr lang="fr-FR"/>
               <a:t>Modifier les styles du texte du masque</a:t>
             </a:r>
           </a:p>
@@ -2352,7 +2333,7 @@
           <a:p>
             <a:fld id="{967AB95B-CF6F-43FD-8F6D-069006E4CBA5}" type="datetimeFigureOut">
               <a:rPr lang="fr-FR" smtClean="0"/>
-              <a:t>13/03/2020</a:t>
+              <a:t>20/03/2020</a:t>
             </a:fld>
             <a:endParaRPr lang="fr-FR"/>
           </a:p>
@@ -2461,10 +2442,9 @@
           <a:lstStyle/>
           <a:p>
             <a:r>
-              <a:rPr lang="fr-FR" smtClean="0"/>
+              <a:rPr lang="fr-FR"/>
               <a:t>Modifiez le style du titre</a:t>
             </a:r>
-            <a:endParaRPr lang="fr-FR"/>
           </a:p>
         </p:txBody>
       </p:sp>
@@ -2495,38 +2475,37 @@
           <a:p>
             <a:pPr lvl="0"/>
             <a:r>
-              <a:rPr lang="fr-FR" smtClean="0"/>
+              <a:rPr lang="fr-FR"/>
               <a:t>Modifier les styles du texte du masque</a:t>
             </a:r>
           </a:p>
           <a:p>
             <a:pPr lvl="1"/>
             <a:r>
-              <a:rPr lang="fr-FR" smtClean="0"/>
+              <a:rPr lang="fr-FR"/>
               <a:t>Deuxième niveau</a:t>
             </a:r>
           </a:p>
           <a:p>
             <a:pPr lvl="2"/>
             <a:r>
-              <a:rPr lang="fr-FR" smtClean="0"/>
+              <a:rPr lang="fr-FR"/>
               <a:t>Troisième niveau</a:t>
             </a:r>
           </a:p>
           <a:p>
             <a:pPr lvl="3"/>
             <a:r>
-              <a:rPr lang="fr-FR" smtClean="0"/>
+              <a:rPr lang="fr-FR"/>
               <a:t>Quatrième niveau</a:t>
             </a:r>
           </a:p>
           <a:p>
             <a:pPr lvl="4"/>
             <a:r>
-              <a:rPr lang="fr-FR" smtClean="0"/>
+              <a:rPr lang="fr-FR"/>
               <a:t>Cinquième niveau</a:t>
             </a:r>
-            <a:endParaRPr lang="fr-FR"/>
           </a:p>
         </p:txBody>
       </p:sp>
@@ -2565,7 +2544,7 @@
           <a:p>
             <a:fld id="{967AB95B-CF6F-43FD-8F6D-069006E4CBA5}" type="datetimeFigureOut">
               <a:rPr lang="fr-FR" smtClean="0"/>
-              <a:t>13/03/2020</a:t>
+              <a:t>20/03/2020</a:t>
             </a:fld>
             <a:endParaRPr lang="fr-FR"/>
           </a:p>
@@ -2978,7 +2957,7 @@
         </p:nvSpPr>
         <p:spPr>
           <a:xfrm>
-            <a:off x="673330" y="689957"/>
+            <a:off x="578610" y="650624"/>
             <a:ext cx="4214553" cy="5361709"/>
           </a:xfrm>
           <a:prstGeom prst="rect">
@@ -3038,10 +3017,9 @@
           <a:lstStyle/>
           <a:p>
             <a:r>
-              <a:rPr lang="fr-FR" sz="1200" dirty="0" smtClean="0"/>
+              <a:rPr lang="fr-FR" sz="1200" dirty="0"/>
               <a:t>RESEAU WIFI LOCAL</a:t>
             </a:r>
-            <a:endParaRPr lang="fr-FR" sz="1200" dirty="0"/>
           </a:p>
         </p:txBody>
       </p:sp>
@@ -3201,10 +3179,9 @@
           <a:lstStyle/>
           <a:p>
             <a:r>
-              <a:rPr lang="fr-FR" sz="1200" dirty="0" smtClean="0"/>
+              <a:rPr lang="fr-FR" sz="1200" dirty="0"/>
               <a:t>ESP8266</a:t>
             </a:r>
-            <a:endParaRPr lang="fr-FR" sz="1200" dirty="0"/>
           </a:p>
         </p:txBody>
       </p:sp>
@@ -3278,10 +3255,9 @@
           <a:lstStyle/>
           <a:p>
             <a:r>
-              <a:rPr lang="fr-FR" sz="1200" dirty="0" smtClean="0"/>
+              <a:rPr lang="fr-FR" sz="1200" dirty="0"/>
               <a:t>Lecteur RFID</a:t>
             </a:r>
-            <a:endParaRPr lang="fr-FR" sz="1200" dirty="0"/>
           </a:p>
         </p:txBody>
       </p:sp>
@@ -3458,8 +3434,8 @@
         </p:nvSpPr>
         <p:spPr>
           <a:xfrm>
-            <a:off x="2481349" y="2080243"/>
-            <a:ext cx="1662545" cy="523220"/>
+            <a:off x="2457791" y="2214667"/>
+            <a:ext cx="1662545" cy="307777"/>
           </a:xfrm>
           <a:prstGeom prst="rect">
             <a:avLst/>
@@ -3474,21 +3450,13 @@
           <a:p>
             <a:pPr algn="ctr"/>
             <a:r>
-              <a:rPr lang="fr-FR" sz="1400" dirty="0" err="1" smtClean="0"/>
+              <a:rPr lang="fr-FR" sz="1400" dirty="0" err="1"/>
               <a:t>Rasp</a:t>
             </a:r>
             <a:r>
-              <a:rPr lang="fr-FR" sz="1400" dirty="0" smtClean="0"/>
+              <a:rPr lang="fr-FR" sz="1400" dirty="0"/>
               <a:t> Pi</a:t>
             </a:r>
-          </a:p>
-          <a:p>
-            <a:pPr algn="ctr"/>
-            <a:r>
-              <a:rPr lang="fr-FR" sz="1400" i="1" dirty="0" smtClean="0"/>
-              <a:t>serveur MQTT</a:t>
-            </a:r>
-            <a:endParaRPr lang="fr-FR" sz="1400" i="1" dirty="0"/>
           </a:p>
         </p:txBody>
       </p:sp>
@@ -3515,16 +3483,15 @@
           <a:lstStyle/>
           <a:p>
             <a:r>
-              <a:rPr lang="fr-FR" sz="1200" dirty="0" smtClean="0"/>
+              <a:rPr lang="fr-FR" sz="1200" dirty="0"/>
               <a:t>IP:</a:t>
             </a:r>
           </a:p>
           <a:p>
             <a:r>
-              <a:rPr lang="fr-FR" sz="1200" dirty="0" smtClean="0"/>
+              <a:rPr lang="fr-FR" sz="1200" dirty="0"/>
               <a:t>MAC:</a:t>
             </a:r>
-            <a:endParaRPr lang="fr-FR" sz="1200" dirty="0"/>
           </a:p>
         </p:txBody>
       </p:sp>
@@ -3536,7 +3503,7 @@
         </p:nvSpPr>
         <p:spPr>
           <a:xfrm>
-            <a:off x="5345082" y="1192876"/>
+            <a:off x="10843551" y="4999967"/>
             <a:ext cx="731520" cy="1373078"/>
           </a:xfrm>
           <a:prstGeom prst="rect">
@@ -3574,7 +3541,7 @@
         </p:nvSpPr>
         <p:spPr>
           <a:xfrm>
-            <a:off x="5368639" y="1645920"/>
+            <a:off x="10867108" y="5453011"/>
             <a:ext cx="663632" cy="461665"/>
           </a:xfrm>
           <a:prstGeom prst="rect">
@@ -3589,26 +3556,26 @@
           <a:lstStyle/>
           <a:p>
             <a:r>
-              <a:rPr lang="fr-FR" sz="1200" dirty="0" smtClean="0"/>
+              <a:rPr lang="fr-FR" sz="1200" dirty="0"/>
               <a:t>Mobile App</a:t>
             </a:r>
-            <a:endParaRPr lang="fr-FR" sz="1200" dirty="0"/>
           </a:p>
         </p:txBody>
       </p:sp>
       <p:cxnSp>
         <p:nvCxnSpPr>
-          <p:cNvPr id="26" name="Connecteur en angle 25"/>
+          <p:cNvPr id="29" name="Connecteur en angle 28"/>
           <p:cNvCxnSpPr>
-            <a:stCxn id="6" idx="0"/>
-            <a:endCxn id="22" idx="2"/>
+            <a:cxnSpLocks/>
+            <a:stCxn id="23" idx="1"/>
+            <a:endCxn id="45" idx="0"/>
           </p:cNvCxnSpPr>
           <p:nvPr/>
         </p:nvCxnSpPr>
         <p:spPr>
-          <a:xfrm rot="5400000" flipH="1" flipV="1">
-            <a:off x="1739593" y="3115350"/>
-            <a:ext cx="1042939" cy="1936865"/>
+          <a:xfrm rot="10800000" flipV="1">
+            <a:off x="6879005" y="5686505"/>
+            <a:ext cx="3964546" cy="362343"/>
           </a:xfrm>
           <a:prstGeom prst="bentConnector3">
             <a:avLst>
@@ -3640,48 +3607,6 @@
           </a:fontRef>
         </p:style>
       </p:cxnSp>
-      <p:cxnSp>
-        <p:nvCxnSpPr>
-          <p:cNvPr id="29" name="Connecteur en angle 28"/>
-          <p:cNvCxnSpPr>
-            <a:stCxn id="23" idx="1"/>
-            <a:endCxn id="21" idx="0"/>
-          </p:cNvCxnSpPr>
-          <p:nvPr/>
-        </p:nvCxnSpPr>
-        <p:spPr>
-          <a:xfrm rot="10800000" flipV="1">
-            <a:off x="3312622" y="1879415"/>
-            <a:ext cx="2032460" cy="200828"/>
-          </a:xfrm>
-          <a:prstGeom prst="bentConnector2">
-            <a:avLst/>
-          </a:prstGeom>
-          <a:ln w="9525" cap="flat" cmpd="sng" algn="ctr">
-            <a:solidFill>
-              <a:schemeClr val="dk1"/>
-            </a:solidFill>
-            <a:prstDash val="dash"/>
-            <a:round/>
-            <a:headEnd type="none" w="med" len="med"/>
-            <a:tailEnd type="none" w="med" len="med"/>
-          </a:ln>
-        </p:spPr>
-        <p:style>
-          <a:lnRef idx="0">
-            <a:scrgbClr r="0" g="0" b="0"/>
-          </a:lnRef>
-          <a:fillRef idx="0">
-            <a:scrgbClr r="0" g="0" b="0"/>
-          </a:fillRef>
-          <a:effectRef idx="0">
-            <a:scrgbClr r="0" g="0" b="0"/>
-          </a:effectRef>
-          <a:fontRef idx="minor">
-            <a:schemeClr val="tx1"/>
-          </a:fontRef>
-        </p:style>
-      </p:cxnSp>
       <p:sp>
         <p:nvSpPr>
           <p:cNvPr id="31" name="Rectangle 30"/>
@@ -3835,7 +3760,7 @@
           <a:lstStyle/>
           <a:p>
             <a:r>
-              <a:rPr lang="fr-FR" sz="1200" dirty="0" smtClean="0"/>
+              <a:rPr lang="fr-FR" sz="1200" dirty="0"/>
               <a:t>BLE</a:t>
             </a:r>
             <a:endParaRPr lang="fr-FR" dirty="0"/>
@@ -3865,10 +3790,9 @@
           <a:lstStyle/>
           <a:p>
             <a:r>
-              <a:rPr lang="fr-FR" sz="1400" dirty="0" smtClean="0"/>
+              <a:rPr lang="fr-FR" sz="1400" dirty="0"/>
               <a:t>NANO 33</a:t>
             </a:r>
-            <a:endParaRPr lang="fr-FR" sz="1400" dirty="0"/>
           </a:p>
         </p:txBody>
       </p:sp>
@@ -3895,10 +3819,9 @@
           <a:lstStyle/>
           <a:p>
             <a:r>
-              <a:rPr lang="fr-FR" sz="1400" dirty="0" smtClean="0"/>
+              <a:rPr lang="fr-FR" sz="1400" dirty="0"/>
               <a:t>NANO 33</a:t>
             </a:r>
-            <a:endParaRPr lang="fr-FR" sz="1400" dirty="0"/>
           </a:p>
         </p:txBody>
       </p:sp>
@@ -4152,14 +4075,13 @@
           <a:lstStyle/>
           <a:p>
             <a:r>
-              <a:rPr lang="fr-FR" sz="1100" dirty="0" err="1" smtClean="0"/>
+              <a:rPr lang="fr-FR" sz="1100" dirty="0" err="1"/>
               <a:t>Servo</a:t>
             </a:r>
             <a:r>
-              <a:rPr lang="fr-FR" sz="1100" dirty="0" smtClean="0"/>
+              <a:rPr lang="fr-FR" sz="1100" dirty="0"/>
               <a:t> moteur</a:t>
             </a:r>
-            <a:endParaRPr lang="fr-FR" sz="1100" dirty="0"/>
           </a:p>
         </p:txBody>
       </p:sp>
@@ -4233,10 +4155,9 @@
           <a:lstStyle/>
           <a:p>
             <a:r>
-              <a:rPr lang="fr-FR" sz="1100" dirty="0" smtClean="0"/>
+              <a:rPr lang="fr-FR" sz="1100" dirty="0"/>
               <a:t>LED rouge</a:t>
             </a:r>
-            <a:endParaRPr lang="fr-FR" sz="1100" dirty="0"/>
           </a:p>
         </p:txBody>
       </p:sp>
@@ -4310,10 +4231,9 @@
           <a:lstStyle/>
           <a:p>
             <a:r>
-              <a:rPr lang="fr-FR" sz="1100" dirty="0" smtClean="0"/>
+              <a:rPr lang="fr-FR" sz="1100" dirty="0"/>
               <a:t>LED blanche</a:t>
             </a:r>
-            <a:endParaRPr lang="fr-FR" sz="1100" dirty="0"/>
           </a:p>
         </p:txBody>
       </p:sp>
@@ -4387,7 +4307,7 @@
           <a:lstStyle/>
           <a:p>
             <a:r>
-              <a:rPr lang="fr-FR" sz="1100" dirty="0" err="1" smtClean="0"/>
+              <a:rPr lang="fr-FR" sz="1100" dirty="0" err="1"/>
               <a:t>Buzzer</a:t>
             </a:r>
             <a:endParaRPr lang="fr-FR" sz="1100" dirty="0"/>
@@ -4464,10 +4384,9 @@
           <a:lstStyle/>
           <a:p>
             <a:r>
-              <a:rPr lang="fr-FR" sz="1100" dirty="0" smtClean="0"/>
+              <a:rPr lang="fr-FR" sz="1100" dirty="0"/>
               <a:t>LED verte</a:t>
             </a:r>
-            <a:endParaRPr lang="fr-FR" sz="1100" dirty="0"/>
           </a:p>
         </p:txBody>
       </p:sp>
@@ -4638,108 +4557,6 @@
       </p:cxnSp>
       <p:sp>
         <p:nvSpPr>
-          <p:cNvPr id="66" name="ZoneTexte 65"/>
-          <p:cNvSpPr txBox="1"/>
-          <p:nvPr/>
-        </p:nvSpPr>
-        <p:spPr>
-          <a:xfrm>
-            <a:off x="733598" y="3837561"/>
-            <a:ext cx="1633451" cy="246221"/>
-          </a:xfrm>
-          <a:prstGeom prst="rect">
-            <a:avLst/>
-          </a:prstGeom>
-          <a:noFill/>
-        </p:spPr>
-        <p:txBody>
-          <a:bodyPr wrap="square" rtlCol="0">
-            <a:spAutoFit/>
-          </a:bodyPr>
-          <a:lstStyle/>
-          <a:p>
-            <a:r>
-              <a:rPr lang="fr-FR" sz="1000" i="1" dirty="0" smtClean="0">
-                <a:solidFill>
-                  <a:schemeClr val="bg1">
-                    <a:lumMod val="50000"/>
-                  </a:schemeClr>
-                </a:solidFill>
-              </a:rPr>
-              <a:t> {Pub: </a:t>
-            </a:r>
-            <a:r>
-              <a:rPr lang="fr-FR" sz="1000" i="1" dirty="0" err="1" smtClean="0">
-                <a:solidFill>
-                  <a:schemeClr val="bg1">
-                    <a:lumMod val="50000"/>
-                  </a:schemeClr>
-                </a:solidFill>
-              </a:rPr>
-              <a:t>guizard</a:t>
-            </a:r>
-            <a:r>
-              <a:rPr lang="fr-FR" sz="1000" i="1" dirty="0" smtClean="0">
-                <a:solidFill>
-                  <a:schemeClr val="bg1">
-                    <a:lumMod val="50000"/>
-                  </a:schemeClr>
-                </a:solidFill>
-              </a:rPr>
-              <a:t>/</a:t>
-            </a:r>
-            <a:r>
-              <a:rPr lang="fr-FR" sz="1000" i="1" dirty="0" err="1" smtClean="0">
-                <a:solidFill>
-                  <a:schemeClr val="bg1">
-                    <a:lumMod val="50000"/>
-                  </a:schemeClr>
-                </a:solidFill>
-              </a:rPr>
-              <a:t>hodor</a:t>
-            </a:r>
-            <a:r>
-              <a:rPr lang="fr-FR" sz="1000" i="1" dirty="0" smtClean="0">
-                <a:solidFill>
-                  <a:schemeClr val="bg1">
-                    <a:lumMod val="50000"/>
-                  </a:schemeClr>
-                </a:solidFill>
-              </a:rPr>
-              <a:t>/</a:t>
-            </a:r>
-            <a:r>
-              <a:rPr lang="fr-FR" sz="1000" i="1" dirty="0" err="1" smtClean="0">
-                <a:solidFill>
-                  <a:schemeClr val="bg1">
-                    <a:lumMod val="50000"/>
-                  </a:schemeClr>
-                </a:solidFill>
-              </a:rPr>
-              <a:t>uid</a:t>
-            </a:r>
-            <a:r>
-              <a:rPr lang="fr-FR" sz="1000" i="1" dirty="0" smtClean="0">
-                <a:solidFill>
-                  <a:schemeClr val="bg1">
-                    <a:lumMod val="50000"/>
-                  </a:schemeClr>
-                </a:solidFill>
-              </a:rPr>
-              <a:t>}</a:t>
-            </a:r>
-            <a:endParaRPr lang="fr-FR" sz="1000" i="1" dirty="0">
-              <a:solidFill>
-                <a:schemeClr val="bg1">
-                  <a:lumMod val="50000"/>
-                </a:schemeClr>
-              </a:solidFill>
-            </a:endParaRPr>
-          </a:p>
-        </p:txBody>
-      </p:sp>
-      <p:sp>
-        <p:nvSpPr>
           <p:cNvPr id="2" name="ZoneTexte 1"/>
           <p:cNvSpPr txBox="1"/>
           <p:nvPr/>
@@ -4775,13 +4592,221 @@
           <a:p>
             <a:pPr algn="ctr"/>
             <a:r>
-              <a:rPr lang="fr-FR" b="1" dirty="0" smtClean="0"/>
+              <a:rPr lang="fr-FR" b="1" dirty="0"/>
               <a:t>ARCHITECTURE MATERIELLE</a:t>
             </a:r>
-            <a:endParaRPr lang="fr-FR" b="1" dirty="0"/>
-          </a:p>
-        </p:txBody>
-      </p:sp>
+          </a:p>
+        </p:txBody>
+      </p:sp>
+      <p:sp>
+        <p:nvSpPr>
+          <p:cNvPr id="17" name="Rectangle 16">
+            <a:extLst>
+              <a:ext uri="{FF2B5EF4-FFF2-40B4-BE49-F238E27FC236}">
+                <a16:creationId xmlns:a16="http://schemas.microsoft.com/office/drawing/2014/main" id="{24CFF6BF-1FAC-4DE4-9CF1-FF4990162DA4}"/>
+              </a:ext>
+            </a:extLst>
+          </p:cNvPr>
+          <p:cNvSpPr/>
+          <p:nvPr/>
+        </p:nvSpPr>
+        <p:spPr>
+          <a:xfrm>
+            <a:off x="3162993" y="5190731"/>
+            <a:ext cx="1151312" cy="704693"/>
+          </a:xfrm>
+          <a:prstGeom prst="rect">
+            <a:avLst/>
+          </a:prstGeom>
+        </p:spPr>
+        <p:style>
+          <a:lnRef idx="2">
+            <a:schemeClr val="dk1"/>
+          </a:lnRef>
+          <a:fillRef idx="1">
+            <a:schemeClr val="lt1"/>
+          </a:fillRef>
+          <a:effectRef idx="0">
+            <a:schemeClr val="dk1"/>
+          </a:effectRef>
+          <a:fontRef idx="minor">
+            <a:schemeClr val="dk1"/>
+          </a:fontRef>
+        </p:style>
+        <p:txBody>
+          <a:bodyPr rtlCol="0" anchor="ctr"/>
+          <a:lstStyle/>
+          <a:p>
+            <a:pPr algn="ctr"/>
+            <a:endParaRPr lang="fr-FR"/>
+          </a:p>
+        </p:txBody>
+      </p:sp>
+      <p:sp>
+        <p:nvSpPr>
+          <p:cNvPr id="25" name="ZoneTexte 24">
+            <a:extLst>
+              <a:ext uri="{FF2B5EF4-FFF2-40B4-BE49-F238E27FC236}">
+                <a16:creationId xmlns:a16="http://schemas.microsoft.com/office/drawing/2014/main" id="{141D65B5-3873-48B7-B249-115ABCE94544}"/>
+              </a:ext>
+            </a:extLst>
+          </p:cNvPr>
+          <p:cNvSpPr txBox="1"/>
+          <p:nvPr/>
+        </p:nvSpPr>
+        <p:spPr>
+          <a:xfrm>
+            <a:off x="3289064" y="5156343"/>
+            <a:ext cx="950427" cy="338554"/>
+          </a:xfrm>
+          <a:prstGeom prst="rect">
+            <a:avLst/>
+          </a:prstGeom>
+          <a:noFill/>
+        </p:spPr>
+        <p:txBody>
+          <a:bodyPr wrap="square" rtlCol="0">
+            <a:spAutoFit/>
+          </a:bodyPr>
+          <a:lstStyle/>
+          <a:p>
+            <a:r>
+              <a:rPr lang="fr-FR" sz="1600" dirty="0"/>
+              <a:t>PAI - box</a:t>
+            </a:r>
+          </a:p>
+        </p:txBody>
+      </p:sp>
+      <p:sp>
+        <p:nvSpPr>
+          <p:cNvPr id="45" name="Nuage 44">
+            <a:extLst>
+              <a:ext uri="{FF2B5EF4-FFF2-40B4-BE49-F238E27FC236}">
+                <a16:creationId xmlns:a16="http://schemas.microsoft.com/office/drawing/2014/main" id="{60F1AA47-0BB7-44C5-B17F-7140A5697F3B}"/>
+              </a:ext>
+            </a:extLst>
+          </p:cNvPr>
+          <p:cNvSpPr/>
+          <p:nvPr/>
+        </p:nvSpPr>
+        <p:spPr>
+          <a:xfrm>
+            <a:off x="5437940" y="5404612"/>
+            <a:ext cx="1442267" cy="1288473"/>
+          </a:xfrm>
+          <a:prstGeom prst="cloud">
+            <a:avLst/>
+          </a:prstGeom>
+        </p:spPr>
+        <p:style>
+          <a:lnRef idx="1">
+            <a:schemeClr val="accent3"/>
+          </a:lnRef>
+          <a:fillRef idx="2">
+            <a:schemeClr val="accent3"/>
+          </a:fillRef>
+          <a:effectRef idx="1">
+            <a:schemeClr val="accent3"/>
+          </a:effectRef>
+          <a:fontRef idx="minor">
+            <a:schemeClr val="dk1"/>
+          </a:fontRef>
+        </p:style>
+        <p:txBody>
+          <a:bodyPr rtlCol="0" anchor="ctr"/>
+          <a:lstStyle/>
+          <a:p>
+            <a:pPr algn="ctr"/>
+            <a:endParaRPr lang="fr-FR"/>
+          </a:p>
+        </p:txBody>
+      </p:sp>
+      <p:sp>
+        <p:nvSpPr>
+          <p:cNvPr id="56" name="ZoneTexte 55">
+            <a:extLst>
+              <a:ext uri="{FF2B5EF4-FFF2-40B4-BE49-F238E27FC236}">
+                <a16:creationId xmlns:a16="http://schemas.microsoft.com/office/drawing/2014/main" id="{BBB5F45B-7953-496D-91D0-57608A4252EC}"/>
+              </a:ext>
+            </a:extLst>
+          </p:cNvPr>
+          <p:cNvSpPr txBox="1"/>
+          <p:nvPr/>
+        </p:nvSpPr>
+        <p:spPr>
+          <a:xfrm>
+            <a:off x="5719157" y="5742000"/>
+            <a:ext cx="908146" cy="584775"/>
+          </a:xfrm>
+          <a:prstGeom prst="rect">
+            <a:avLst/>
+          </a:prstGeom>
+          <a:noFill/>
+        </p:spPr>
+        <p:txBody>
+          <a:bodyPr wrap="square" rtlCol="0">
+            <a:spAutoFit/>
+          </a:bodyPr>
+          <a:lstStyle/>
+          <a:p>
+            <a:r>
+              <a:rPr lang="fr-FR" sz="1600" dirty="0"/>
+              <a:t>Réseau Internet</a:t>
+            </a:r>
+          </a:p>
+        </p:txBody>
+      </p:sp>
+      <p:cxnSp>
+        <p:nvCxnSpPr>
+          <p:cNvPr id="64" name="Connecteur en angle 28">
+            <a:extLst>
+              <a:ext uri="{FF2B5EF4-FFF2-40B4-BE49-F238E27FC236}">
+                <a16:creationId xmlns:a16="http://schemas.microsoft.com/office/drawing/2014/main" id="{BEA4C371-5EB4-4F48-A7D3-738A30A6D43D}"/>
+              </a:ext>
+            </a:extLst>
+          </p:cNvPr>
+          <p:cNvCxnSpPr>
+            <a:cxnSpLocks/>
+            <a:stCxn id="17" idx="3"/>
+            <a:endCxn id="45" idx="2"/>
+          </p:cNvCxnSpPr>
+          <p:nvPr/>
+        </p:nvCxnSpPr>
+        <p:spPr>
+          <a:xfrm>
+            <a:off x="4314305" y="5543078"/>
+            <a:ext cx="1128109" cy="505771"/>
+          </a:xfrm>
+          <a:prstGeom prst="bentConnector3">
+            <a:avLst>
+              <a:gd name="adj1" fmla="val 73053"/>
+            </a:avLst>
+          </a:prstGeom>
+          <a:ln w="9525" cap="flat" cmpd="sng" algn="ctr">
+            <a:solidFill>
+              <a:schemeClr val="dk1"/>
+            </a:solidFill>
+            <a:prstDash val="dash"/>
+            <a:round/>
+            <a:headEnd type="none" w="med" len="med"/>
+            <a:tailEnd type="none" w="med" len="med"/>
+          </a:ln>
+        </p:spPr>
+        <p:style>
+          <a:lnRef idx="0">
+            <a:scrgbClr r="0" g="0" b="0"/>
+          </a:lnRef>
+          <a:fillRef idx="0">
+            <a:scrgbClr r="0" g="0" b="0"/>
+          </a:fillRef>
+          <a:effectRef idx="0">
+            <a:scrgbClr r="0" g="0" b="0"/>
+          </a:effectRef>
+          <a:fontRef idx="minor">
+            <a:schemeClr val="tx1"/>
+          </a:fontRef>
+        </p:style>
+      </p:cxnSp>
     </p:spTree>
     <p:extLst>
       <p:ext uri="{BB962C8B-B14F-4D97-AF65-F5344CB8AC3E}">
@@ -4880,10 +4905,9 @@
           <a:lstStyle/>
           <a:p>
             <a:r>
-              <a:rPr lang="fr-FR" sz="1200" dirty="0" smtClean="0"/>
+              <a:rPr lang="fr-FR" sz="1200" dirty="0"/>
               <a:t>RESEAU WIFI LOCAL</a:t>
             </a:r>
-            <a:endParaRPr lang="fr-FR" sz="1200" dirty="0"/>
           </a:p>
         </p:txBody>
       </p:sp>
@@ -5043,10 +5067,9 @@
           <a:lstStyle/>
           <a:p>
             <a:r>
-              <a:rPr lang="fr-FR" sz="1200" dirty="0" smtClean="0"/>
+              <a:rPr lang="fr-FR" sz="1200" dirty="0"/>
               <a:t>ESP8266</a:t>
             </a:r>
-            <a:endParaRPr lang="fr-FR" sz="1200" dirty="0"/>
           </a:p>
         </p:txBody>
       </p:sp>
@@ -5120,10 +5143,9 @@
           <a:lstStyle/>
           <a:p>
             <a:r>
-              <a:rPr lang="fr-FR" sz="1200" dirty="0" smtClean="0"/>
+              <a:rPr lang="fr-FR" sz="1200" dirty="0"/>
               <a:t>Lecteur RFID</a:t>
             </a:r>
-            <a:endParaRPr lang="fr-FR" sz="1200" dirty="0"/>
           </a:p>
         </p:txBody>
       </p:sp>
@@ -5131,6 +5153,7 @@
         <p:nvCxnSpPr>
           <p:cNvPr id="13" name="Connecteur droit 12"/>
           <p:cNvCxnSpPr>
+            <a:cxnSpLocks/>
             <a:stCxn id="11" idx="0"/>
           </p:cNvCxnSpPr>
           <p:nvPr/>
@@ -5301,7 +5324,7 @@
         <p:spPr>
           <a:xfrm>
             <a:off x="2481349" y="2080243"/>
-            <a:ext cx="1662545" cy="523220"/>
+            <a:ext cx="1662545" cy="307777"/>
           </a:xfrm>
           <a:prstGeom prst="rect">
             <a:avLst/>
@@ -5316,21 +5339,13 @@
           <a:p>
             <a:pPr algn="ctr"/>
             <a:r>
-              <a:rPr lang="fr-FR" sz="1400" dirty="0" err="1" smtClean="0"/>
+              <a:rPr lang="fr-FR" sz="1400" dirty="0" err="1"/>
               <a:t>Rasp</a:t>
             </a:r>
             <a:r>
-              <a:rPr lang="fr-FR" sz="1400" dirty="0" smtClean="0"/>
+              <a:rPr lang="fr-FR" sz="1400" dirty="0"/>
               <a:t> Pi</a:t>
             </a:r>
-          </a:p>
-          <a:p>
-            <a:pPr algn="ctr"/>
-            <a:r>
-              <a:rPr lang="fr-FR" sz="1400" i="1" dirty="0" smtClean="0"/>
-              <a:t>serveur MQTT</a:t>
-            </a:r>
-            <a:endParaRPr lang="fr-FR" sz="1400" i="1" dirty="0"/>
           </a:p>
         </p:txBody>
       </p:sp>
@@ -5357,84 +5372,15 @@
           <a:lstStyle/>
           <a:p>
             <a:r>
-              <a:rPr lang="fr-FR" sz="1200" dirty="0" smtClean="0"/>
+              <a:rPr lang="fr-FR" sz="1200" dirty="0"/>
               <a:t>IP:</a:t>
             </a:r>
           </a:p>
           <a:p>
             <a:r>
-              <a:rPr lang="fr-FR" sz="1200" dirty="0" smtClean="0"/>
+              <a:rPr lang="fr-FR" sz="1200" dirty="0"/>
               <a:t>MAC:</a:t>
             </a:r>
-            <a:endParaRPr lang="fr-FR" sz="1200" dirty="0"/>
-          </a:p>
-        </p:txBody>
-      </p:sp>
-      <p:sp>
-        <p:nvSpPr>
-          <p:cNvPr id="20" name="Rectangle 19"/>
-          <p:cNvSpPr/>
-          <p:nvPr/>
-        </p:nvSpPr>
-        <p:spPr>
-          <a:xfrm>
-            <a:off x="5345082" y="1192876"/>
-            <a:ext cx="731520" cy="1373078"/>
-          </a:xfrm>
-          <a:prstGeom prst="rect">
-            <a:avLst/>
-          </a:prstGeom>
-        </p:spPr>
-        <p:style>
-          <a:lnRef idx="2">
-            <a:schemeClr val="dk1"/>
-          </a:lnRef>
-          <a:fillRef idx="1">
-            <a:schemeClr val="lt1"/>
-          </a:fillRef>
-          <a:effectRef idx="0">
-            <a:schemeClr val="dk1"/>
-          </a:effectRef>
-          <a:fontRef idx="minor">
-            <a:schemeClr val="dk1"/>
-          </a:fontRef>
-        </p:style>
-        <p:txBody>
-          <a:bodyPr rtlCol="0" anchor="ctr"/>
-          <a:lstStyle/>
-          <a:p>
-            <a:pPr algn="ctr"/>
-            <a:endParaRPr lang="fr-FR"/>
-          </a:p>
-        </p:txBody>
-      </p:sp>
-      <p:sp>
-        <p:nvSpPr>
-          <p:cNvPr id="21" name="ZoneTexte 20"/>
-          <p:cNvSpPr txBox="1"/>
-          <p:nvPr/>
-        </p:nvSpPr>
-        <p:spPr>
-          <a:xfrm>
-            <a:off x="5368639" y="1645920"/>
-            <a:ext cx="663632" cy="461665"/>
-          </a:xfrm>
-          <a:prstGeom prst="rect">
-            <a:avLst/>
-          </a:prstGeom>
-          <a:noFill/>
-        </p:spPr>
-        <p:txBody>
-          <a:bodyPr wrap="square" rtlCol="0">
-            <a:spAutoFit/>
-          </a:bodyPr>
-          <a:lstStyle/>
-          <a:p>
-            <a:r>
-              <a:rPr lang="fr-FR" sz="1200" dirty="0" smtClean="0"/>
-              <a:t>Mobile App</a:t>
-            </a:r>
-            <a:endParaRPr lang="fr-FR" sz="1200" dirty="0"/>
           </a:p>
         </p:txBody>
       </p:sp>
@@ -5442,20 +5388,19 @@
         <p:nvCxnSpPr>
           <p:cNvPr id="22" name="Connecteur en angle 21"/>
           <p:cNvCxnSpPr>
+            <a:cxnSpLocks/>
             <a:stCxn id="6" idx="0"/>
-            <a:endCxn id="19" idx="2"/>
+            <a:endCxn id="219" idx="1"/>
           </p:cNvCxnSpPr>
           <p:nvPr/>
         </p:nvCxnSpPr>
         <p:spPr>
           <a:xfrm rot="5400000" flipH="1" flipV="1">
-            <a:off x="1739593" y="3115350"/>
-            <a:ext cx="1042939" cy="1936865"/>
-          </a:xfrm>
-          <a:prstGeom prst="bentConnector3">
-            <a:avLst>
-              <a:gd name="adj1" fmla="val 50000"/>
-            </a:avLst>
+            <a:off x="928230" y="2937411"/>
+            <a:ext cx="2032240" cy="1303440"/>
+          </a:xfrm>
+          <a:prstGeom prst="bentConnector2">
+            <a:avLst/>
           </a:prstGeom>
           <a:ln w="9525" cap="flat" cmpd="sng" algn="ctr">
             <a:solidFill>
@@ -5482,48 +5427,6 @@
           </a:fontRef>
         </p:style>
       </p:cxnSp>
-      <p:cxnSp>
-        <p:nvCxnSpPr>
-          <p:cNvPr id="23" name="Connecteur en angle 22"/>
-          <p:cNvCxnSpPr>
-            <a:stCxn id="20" idx="1"/>
-            <a:endCxn id="18" idx="0"/>
-          </p:cNvCxnSpPr>
-          <p:nvPr/>
-        </p:nvCxnSpPr>
-        <p:spPr>
-          <a:xfrm rot="10800000" flipV="1">
-            <a:off x="3312622" y="1879415"/>
-            <a:ext cx="2032460" cy="200828"/>
-          </a:xfrm>
-          <a:prstGeom prst="bentConnector2">
-            <a:avLst/>
-          </a:prstGeom>
-          <a:ln w="9525" cap="flat" cmpd="sng" algn="ctr">
-            <a:solidFill>
-              <a:schemeClr val="dk1"/>
-            </a:solidFill>
-            <a:prstDash val="dash"/>
-            <a:round/>
-            <a:headEnd type="none" w="med" len="med"/>
-            <a:tailEnd type="none" w="med" len="med"/>
-          </a:ln>
-        </p:spPr>
-        <p:style>
-          <a:lnRef idx="0">
-            <a:scrgbClr r="0" g="0" b="0"/>
-          </a:lnRef>
-          <a:fillRef idx="0">
-            <a:scrgbClr r="0" g="0" b="0"/>
-          </a:fillRef>
-          <a:effectRef idx="0">
-            <a:scrgbClr r="0" g="0" b="0"/>
-          </a:effectRef>
-          <a:fontRef idx="minor">
-            <a:schemeClr val="tx1"/>
-          </a:fontRef>
-        </p:style>
-      </p:cxnSp>
       <p:sp>
         <p:nvSpPr>
           <p:cNvPr id="24" name="Rectangle 23"/>
@@ -5677,7 +5580,7 @@
           <a:lstStyle/>
           <a:p>
             <a:r>
-              <a:rPr lang="fr-FR" sz="1200" dirty="0" smtClean="0"/>
+              <a:rPr lang="fr-FR" sz="1200" dirty="0"/>
               <a:t>BLE</a:t>
             </a:r>
             <a:endParaRPr lang="fr-FR" dirty="0"/>
@@ -5707,10 +5610,9 @@
           <a:lstStyle/>
           <a:p>
             <a:r>
-              <a:rPr lang="fr-FR" sz="1400" dirty="0" smtClean="0"/>
+              <a:rPr lang="fr-FR" sz="1400" dirty="0"/>
               <a:t>NANO 33</a:t>
             </a:r>
-            <a:endParaRPr lang="fr-FR" sz="1400" dirty="0"/>
           </a:p>
         </p:txBody>
       </p:sp>
@@ -5737,10 +5639,9 @@
           <a:lstStyle/>
           <a:p>
             <a:r>
-              <a:rPr lang="fr-FR" sz="1400" dirty="0" smtClean="0"/>
+              <a:rPr lang="fr-FR" sz="1400" dirty="0"/>
               <a:t>NANO 33</a:t>
             </a:r>
-            <a:endParaRPr lang="fr-FR" sz="1400" dirty="0"/>
           </a:p>
         </p:txBody>
       </p:sp>
@@ -5994,14 +5895,13 @@
           <a:lstStyle/>
           <a:p>
             <a:r>
-              <a:rPr lang="fr-FR" sz="1100" dirty="0" err="1" smtClean="0"/>
+              <a:rPr lang="fr-FR" sz="1100" dirty="0" err="1"/>
               <a:t>Servo</a:t>
             </a:r>
             <a:r>
-              <a:rPr lang="fr-FR" sz="1100" dirty="0" smtClean="0"/>
+              <a:rPr lang="fr-FR" sz="1100" dirty="0"/>
               <a:t> moteur</a:t>
             </a:r>
-            <a:endParaRPr lang="fr-FR" sz="1100" dirty="0"/>
           </a:p>
         </p:txBody>
       </p:sp>
@@ -6075,10 +5975,9 @@
           <a:lstStyle/>
           <a:p>
             <a:r>
-              <a:rPr lang="fr-FR" sz="1100" dirty="0" smtClean="0"/>
+              <a:rPr lang="fr-FR" sz="1100" dirty="0"/>
               <a:t>LED rouge</a:t>
             </a:r>
-            <a:endParaRPr lang="fr-FR" sz="1100" dirty="0"/>
           </a:p>
         </p:txBody>
       </p:sp>
@@ -6152,10 +6051,9 @@
           <a:lstStyle/>
           <a:p>
             <a:r>
-              <a:rPr lang="fr-FR" sz="1100" dirty="0" smtClean="0"/>
+              <a:rPr lang="fr-FR" sz="1100" dirty="0"/>
               <a:t>LED blanche</a:t>
             </a:r>
-            <a:endParaRPr lang="fr-FR" sz="1100" dirty="0"/>
           </a:p>
         </p:txBody>
       </p:sp>
@@ -6229,7 +6127,7 @@
           <a:lstStyle/>
           <a:p>
             <a:r>
-              <a:rPr lang="fr-FR" sz="1100" dirty="0" err="1" smtClean="0"/>
+              <a:rPr lang="fr-FR" sz="1100" dirty="0" err="1"/>
               <a:t>Buzzer</a:t>
             </a:r>
             <a:endParaRPr lang="fr-FR" sz="1100" dirty="0"/>
@@ -6306,10 +6204,9 @@
           <a:lstStyle/>
           <a:p>
             <a:r>
-              <a:rPr lang="fr-FR" sz="1100" dirty="0" smtClean="0"/>
+              <a:rPr lang="fr-FR" sz="1100" dirty="0"/>
               <a:t>LED verte</a:t>
             </a:r>
-            <a:endParaRPr lang="fr-FR" sz="1100" dirty="0"/>
           </a:p>
         </p:txBody>
       </p:sp>
@@ -6317,6 +6214,7 @@
         <p:nvCxnSpPr>
           <p:cNvPr id="46" name="Connecteur en angle 45"/>
           <p:cNvCxnSpPr>
+            <a:cxnSpLocks/>
             <a:stCxn id="37" idx="3"/>
             <a:endCxn id="28" idx="1"/>
           </p:cNvCxnSpPr>
@@ -6350,6 +6248,7 @@
         <p:nvCxnSpPr>
           <p:cNvPr id="47" name="Connecteur en angle 46"/>
           <p:cNvCxnSpPr>
+            <a:cxnSpLocks/>
             <a:stCxn id="44" idx="3"/>
             <a:endCxn id="29" idx="1"/>
           </p:cNvCxnSpPr>
@@ -6383,6 +6282,7 @@
         <p:nvCxnSpPr>
           <p:cNvPr id="48" name="Connecteur en angle 47"/>
           <p:cNvCxnSpPr>
+            <a:cxnSpLocks/>
             <a:stCxn id="38" idx="3"/>
             <a:endCxn id="29" idx="1"/>
           </p:cNvCxnSpPr>
@@ -6416,6 +6316,7 @@
         <p:nvCxnSpPr>
           <p:cNvPr id="49" name="Connecteur en angle 48"/>
           <p:cNvCxnSpPr>
+            <a:cxnSpLocks/>
             <a:stCxn id="41" idx="3"/>
             <a:endCxn id="29" idx="1"/>
           </p:cNvCxnSpPr>
@@ -6449,6 +6350,7 @@
         <p:nvCxnSpPr>
           <p:cNvPr id="50" name="Connecteur en angle 49"/>
           <p:cNvCxnSpPr>
+            <a:cxnSpLocks/>
             <a:stCxn id="43" idx="3"/>
             <a:endCxn id="29" idx="1"/>
           </p:cNvCxnSpPr>
@@ -6486,7 +6388,7 @@
         </p:nvSpPr>
         <p:spPr>
           <a:xfrm>
-            <a:off x="3312621" y="1628918"/>
+            <a:off x="9064109" y="5413661"/>
             <a:ext cx="1633451" cy="246221"/>
           </a:xfrm>
           <a:prstGeom prst="rect">
@@ -6501,7 +6403,7 @@
           <a:lstStyle/>
           <a:p>
             <a:r>
-              <a:rPr lang="fr-FR" sz="1000" i="1" dirty="0" smtClean="0">
+              <a:rPr lang="fr-FR" sz="1000" i="1" dirty="0">
                 <a:solidFill>
                   <a:schemeClr val="bg1">
                     <a:lumMod val="50000"/>
@@ -6510,13 +6412,6 @@
               </a:rPr>
               <a:t>Communication en HTTPS</a:t>
             </a:r>
-            <a:endParaRPr lang="fr-FR" sz="1000" i="1" dirty="0">
-              <a:solidFill>
-                <a:schemeClr val="bg1">
-                  <a:lumMod val="50000"/>
-                </a:schemeClr>
-              </a:solidFill>
-            </a:endParaRPr>
           </a:p>
         </p:txBody>
       </p:sp>
@@ -6557,10 +6452,9 @@
           <a:p>
             <a:pPr algn="ctr"/>
             <a:r>
-              <a:rPr lang="fr-FR" b="1" dirty="0" smtClean="0"/>
+              <a:rPr lang="fr-FR" b="1" dirty="0"/>
               <a:t>ARCHITECTURE LOGICIELLE</a:t>
             </a:r>
-            <a:endParaRPr lang="fr-FR" b="1" dirty="0"/>
           </a:p>
         </p:txBody>
       </p:sp>
@@ -6572,8 +6466,8 @@
         </p:nvSpPr>
         <p:spPr>
           <a:xfrm>
-            <a:off x="752302" y="3665036"/>
-            <a:ext cx="1633451" cy="400110"/>
+            <a:off x="682557" y="1858068"/>
+            <a:ext cx="1633451" cy="707886"/>
           </a:xfrm>
           <a:prstGeom prst="rect">
             <a:avLst/>
@@ -6587,39 +6481,49 @@
           <a:lstStyle/>
           <a:p>
             <a:r>
-              <a:rPr lang="fr-FR" sz="1000" i="1" dirty="0" smtClean="0">
+              <a:rPr lang="fr-FR" sz="1000" i="1" dirty="0">
                 <a:solidFill>
                   <a:schemeClr val="bg1">
                     <a:lumMod val="50000"/>
                   </a:schemeClr>
                 </a:solidFill>
               </a:rPr>
-              <a:t>Message chiffré</a:t>
-            </a:r>
-          </a:p>
-          <a:p>
-            <a:r>
-              <a:rPr lang="fr-FR" sz="1000" i="1" dirty="0" smtClean="0">
+              <a:t>Message chiffré transmis via le réseau </a:t>
+            </a:r>
+            <a:r>
+              <a:rPr lang="fr-FR" sz="1000" i="1" dirty="0" err="1">
                 <a:solidFill>
                   <a:schemeClr val="bg1">
                     <a:lumMod val="50000"/>
                   </a:schemeClr>
                 </a:solidFill>
               </a:rPr>
-              <a:t>{</a:t>
-            </a:r>
-            <a:r>
-              <a:rPr lang="fr-FR" sz="1000" i="1" dirty="0" smtClean="0">
+              <a:t>WiFi</a:t>
+            </a:r>
+            <a:r>
+              <a:rPr lang="fr-FR" sz="1000" i="1" dirty="0">
                 <a:solidFill>
                   <a:schemeClr val="bg1">
                     <a:lumMod val="50000"/>
                   </a:schemeClr>
                 </a:solidFill>
               </a:rPr>
-              <a:t>Pub: </a:t>
-            </a:r>
-            <a:r>
-              <a:rPr lang="fr-FR" sz="1000" i="1" dirty="0" err="1" smtClean="0">
+              <a:t> local vers le serveur MQTT</a:t>
+            </a:r>
+          </a:p>
+          <a:p>
+            <a:r>
+              <a:rPr lang="fr-FR" sz="1000" i="1" dirty="0">
+                <a:solidFill>
+                  <a:schemeClr val="bg1">
+                    <a:lumMod val="50000"/>
+                  </a:schemeClr>
+                </a:solidFill>
+              </a:rPr>
+              <a:t>{Pub: </a:t>
+            </a:r>
+            <a:r>
+              <a:rPr lang="fr-FR" sz="1000" i="1" dirty="0" err="1">
                 <a:solidFill>
                   <a:schemeClr val="bg1">
                     <a:lumMod val="50000"/>
@@ -6629,7 +6533,7 @@
               <a:t>guizard</a:t>
             </a:r>
             <a:r>
-              <a:rPr lang="fr-FR" sz="1000" i="1" dirty="0" smtClean="0">
+              <a:rPr lang="fr-FR" sz="1000" i="1" dirty="0">
                 <a:solidFill>
                   <a:schemeClr val="bg1">
                     <a:lumMod val="50000"/>
@@ -6639,7 +6543,7 @@
               <a:t>/</a:t>
             </a:r>
             <a:r>
-              <a:rPr lang="fr-FR" sz="1000" i="1" dirty="0" err="1" smtClean="0">
+              <a:rPr lang="fr-FR" sz="1000" i="1" dirty="0" err="1">
                 <a:solidFill>
                   <a:schemeClr val="bg1">
                     <a:lumMod val="50000"/>
@@ -6649,7 +6553,7 @@
               <a:t>hodor</a:t>
             </a:r>
             <a:r>
-              <a:rPr lang="fr-FR" sz="1000" i="1" dirty="0" smtClean="0">
+              <a:rPr lang="fr-FR" sz="1000" i="1" dirty="0">
                 <a:solidFill>
                   <a:schemeClr val="bg1">
                     <a:lumMod val="50000"/>
@@ -6659,7 +6563,7 @@
               <a:t>/</a:t>
             </a:r>
             <a:r>
-              <a:rPr lang="fr-FR" sz="1000" i="1" dirty="0" err="1" smtClean="0">
+              <a:rPr lang="fr-FR" sz="1000" i="1" dirty="0" err="1">
                 <a:solidFill>
                   <a:schemeClr val="bg1">
                     <a:lumMod val="50000"/>
@@ -6669,7 +6573,7 @@
               <a:t>uid</a:t>
             </a:r>
             <a:r>
-              <a:rPr lang="fr-FR" sz="1000" i="1" dirty="0" smtClean="0">
+              <a:rPr lang="fr-FR" sz="1000" i="1" dirty="0">
                 <a:solidFill>
                   <a:schemeClr val="bg1">
                     <a:lumMod val="50000"/>
@@ -6678,13 +6582,720 @@
               </a:rPr>
               <a:t>}</a:t>
             </a:r>
-            <a:endParaRPr lang="fr-FR" sz="1000" i="1" dirty="0">
-              <a:solidFill>
-                <a:schemeClr val="bg1">
-                  <a:lumMod val="50000"/>
-                </a:schemeClr>
-              </a:solidFill>
-            </a:endParaRPr>
+          </a:p>
+        </p:txBody>
+      </p:sp>
+      <p:sp>
+        <p:nvSpPr>
+          <p:cNvPr id="204" name="Rectangle 203">
+            <a:extLst>
+              <a:ext uri="{FF2B5EF4-FFF2-40B4-BE49-F238E27FC236}">
+                <a16:creationId xmlns:a16="http://schemas.microsoft.com/office/drawing/2014/main" id="{279D413B-DAE1-4580-A281-435E234FAF5D}"/>
+              </a:ext>
+            </a:extLst>
+          </p:cNvPr>
+          <p:cNvSpPr/>
+          <p:nvPr/>
+        </p:nvSpPr>
+        <p:spPr>
+          <a:xfrm>
+            <a:off x="10843551" y="4999967"/>
+            <a:ext cx="731520" cy="1373078"/>
+          </a:xfrm>
+          <a:prstGeom prst="rect">
+            <a:avLst/>
+          </a:prstGeom>
+        </p:spPr>
+        <p:style>
+          <a:lnRef idx="2">
+            <a:schemeClr val="dk1"/>
+          </a:lnRef>
+          <a:fillRef idx="1">
+            <a:schemeClr val="lt1"/>
+          </a:fillRef>
+          <a:effectRef idx="0">
+            <a:schemeClr val="dk1"/>
+          </a:effectRef>
+          <a:fontRef idx="minor">
+            <a:schemeClr val="dk1"/>
+          </a:fontRef>
+        </p:style>
+        <p:txBody>
+          <a:bodyPr rtlCol="0" anchor="ctr"/>
+          <a:lstStyle/>
+          <a:p>
+            <a:pPr algn="ctr"/>
+            <a:endParaRPr lang="fr-FR"/>
+          </a:p>
+        </p:txBody>
+      </p:sp>
+      <p:sp>
+        <p:nvSpPr>
+          <p:cNvPr id="205" name="ZoneTexte 204">
+            <a:extLst>
+              <a:ext uri="{FF2B5EF4-FFF2-40B4-BE49-F238E27FC236}">
+                <a16:creationId xmlns:a16="http://schemas.microsoft.com/office/drawing/2014/main" id="{6BC68A62-4CCF-4BC7-8088-D92373E2B399}"/>
+              </a:ext>
+            </a:extLst>
+          </p:cNvPr>
+          <p:cNvSpPr txBox="1"/>
+          <p:nvPr/>
+        </p:nvSpPr>
+        <p:spPr>
+          <a:xfrm>
+            <a:off x="10867108" y="5453011"/>
+            <a:ext cx="663632" cy="461665"/>
+          </a:xfrm>
+          <a:prstGeom prst="rect">
+            <a:avLst/>
+          </a:prstGeom>
+          <a:noFill/>
+        </p:spPr>
+        <p:txBody>
+          <a:bodyPr wrap="square" rtlCol="0">
+            <a:spAutoFit/>
+          </a:bodyPr>
+          <a:lstStyle/>
+          <a:p>
+            <a:r>
+              <a:rPr lang="fr-FR" sz="1200" dirty="0"/>
+              <a:t>Mobile App</a:t>
+            </a:r>
+          </a:p>
+        </p:txBody>
+      </p:sp>
+      <p:cxnSp>
+        <p:nvCxnSpPr>
+          <p:cNvPr id="206" name="Connecteur en angle 28">
+            <a:extLst>
+              <a:ext uri="{FF2B5EF4-FFF2-40B4-BE49-F238E27FC236}">
+                <a16:creationId xmlns:a16="http://schemas.microsoft.com/office/drawing/2014/main" id="{7ECD630C-B9C0-42BD-9520-312D724836CB}"/>
+              </a:ext>
+            </a:extLst>
+          </p:cNvPr>
+          <p:cNvCxnSpPr>
+            <a:cxnSpLocks/>
+            <a:stCxn id="204" idx="1"/>
+            <a:endCxn id="209" idx="0"/>
+          </p:cNvCxnSpPr>
+          <p:nvPr/>
+        </p:nvCxnSpPr>
+        <p:spPr>
+          <a:xfrm rot="10800000" flipV="1">
+            <a:off x="7774953" y="5686506"/>
+            <a:ext cx="3068598" cy="365160"/>
+          </a:xfrm>
+          <a:prstGeom prst="bentConnector3">
+            <a:avLst>
+              <a:gd name="adj1" fmla="val 50000"/>
+            </a:avLst>
+          </a:prstGeom>
+          <a:ln w="9525" cap="flat" cmpd="sng" algn="ctr">
+            <a:solidFill>
+              <a:schemeClr val="dk1"/>
+            </a:solidFill>
+            <a:prstDash val="dash"/>
+            <a:round/>
+            <a:headEnd type="none" w="med" len="med"/>
+            <a:tailEnd type="none" w="med" len="med"/>
+          </a:ln>
+        </p:spPr>
+        <p:style>
+          <a:lnRef idx="0">
+            <a:scrgbClr r="0" g="0" b="0"/>
+          </a:lnRef>
+          <a:fillRef idx="0">
+            <a:scrgbClr r="0" g="0" b="0"/>
+          </a:fillRef>
+          <a:effectRef idx="0">
+            <a:scrgbClr r="0" g="0" b="0"/>
+          </a:effectRef>
+          <a:fontRef idx="minor">
+            <a:schemeClr val="tx1"/>
+          </a:fontRef>
+        </p:style>
+      </p:cxnSp>
+      <p:sp>
+        <p:nvSpPr>
+          <p:cNvPr id="207" name="Rectangle 206">
+            <a:extLst>
+              <a:ext uri="{FF2B5EF4-FFF2-40B4-BE49-F238E27FC236}">
+                <a16:creationId xmlns:a16="http://schemas.microsoft.com/office/drawing/2014/main" id="{18822A52-2C04-444B-8E38-7C84894248FB}"/>
+              </a:ext>
+            </a:extLst>
+          </p:cNvPr>
+          <p:cNvSpPr/>
+          <p:nvPr/>
+        </p:nvSpPr>
+        <p:spPr>
+          <a:xfrm>
+            <a:off x="3162993" y="5190731"/>
+            <a:ext cx="1151312" cy="704693"/>
+          </a:xfrm>
+          <a:prstGeom prst="rect">
+            <a:avLst/>
+          </a:prstGeom>
+        </p:spPr>
+        <p:style>
+          <a:lnRef idx="2">
+            <a:schemeClr val="dk1"/>
+          </a:lnRef>
+          <a:fillRef idx="1">
+            <a:schemeClr val="lt1"/>
+          </a:fillRef>
+          <a:effectRef idx="0">
+            <a:schemeClr val="dk1"/>
+          </a:effectRef>
+          <a:fontRef idx="minor">
+            <a:schemeClr val="dk1"/>
+          </a:fontRef>
+        </p:style>
+        <p:txBody>
+          <a:bodyPr rtlCol="0" anchor="ctr"/>
+          <a:lstStyle/>
+          <a:p>
+            <a:pPr algn="ctr"/>
+            <a:endParaRPr lang="fr-FR"/>
+          </a:p>
+        </p:txBody>
+      </p:sp>
+      <p:sp>
+        <p:nvSpPr>
+          <p:cNvPr id="208" name="ZoneTexte 207">
+            <a:extLst>
+              <a:ext uri="{FF2B5EF4-FFF2-40B4-BE49-F238E27FC236}">
+                <a16:creationId xmlns:a16="http://schemas.microsoft.com/office/drawing/2014/main" id="{1AEFD7B3-5FC9-4B47-8097-1635FD0BEC04}"/>
+              </a:ext>
+            </a:extLst>
+          </p:cNvPr>
+          <p:cNvSpPr txBox="1"/>
+          <p:nvPr/>
+        </p:nvSpPr>
+        <p:spPr>
+          <a:xfrm>
+            <a:off x="3289064" y="5156343"/>
+            <a:ext cx="950427" cy="338554"/>
+          </a:xfrm>
+          <a:prstGeom prst="rect">
+            <a:avLst/>
+          </a:prstGeom>
+          <a:noFill/>
+        </p:spPr>
+        <p:txBody>
+          <a:bodyPr wrap="square" rtlCol="0">
+            <a:spAutoFit/>
+          </a:bodyPr>
+          <a:lstStyle/>
+          <a:p>
+            <a:r>
+              <a:rPr lang="fr-FR" sz="1600" dirty="0"/>
+              <a:t>PAI - box</a:t>
+            </a:r>
+          </a:p>
+        </p:txBody>
+      </p:sp>
+      <p:sp>
+        <p:nvSpPr>
+          <p:cNvPr id="209" name="Nuage 208">
+            <a:extLst>
+              <a:ext uri="{FF2B5EF4-FFF2-40B4-BE49-F238E27FC236}">
+                <a16:creationId xmlns:a16="http://schemas.microsoft.com/office/drawing/2014/main" id="{C10D2380-0EB6-48B2-9D5C-3D49ECCC5DF0}"/>
+              </a:ext>
+            </a:extLst>
+          </p:cNvPr>
+          <p:cNvSpPr/>
+          <p:nvPr/>
+        </p:nvSpPr>
+        <p:spPr>
+          <a:xfrm>
+            <a:off x="6333888" y="5407429"/>
+            <a:ext cx="1442267" cy="1288473"/>
+          </a:xfrm>
+          <a:prstGeom prst="cloud">
+            <a:avLst/>
+          </a:prstGeom>
+        </p:spPr>
+        <p:style>
+          <a:lnRef idx="1">
+            <a:schemeClr val="accent3"/>
+          </a:lnRef>
+          <a:fillRef idx="2">
+            <a:schemeClr val="accent3"/>
+          </a:fillRef>
+          <a:effectRef idx="1">
+            <a:schemeClr val="accent3"/>
+          </a:effectRef>
+          <a:fontRef idx="minor">
+            <a:schemeClr val="dk1"/>
+          </a:fontRef>
+        </p:style>
+        <p:txBody>
+          <a:bodyPr rtlCol="0" anchor="ctr"/>
+          <a:lstStyle/>
+          <a:p>
+            <a:pPr algn="ctr"/>
+            <a:endParaRPr lang="fr-FR"/>
+          </a:p>
+        </p:txBody>
+      </p:sp>
+      <p:sp>
+        <p:nvSpPr>
+          <p:cNvPr id="210" name="ZoneTexte 209">
+            <a:extLst>
+              <a:ext uri="{FF2B5EF4-FFF2-40B4-BE49-F238E27FC236}">
+                <a16:creationId xmlns:a16="http://schemas.microsoft.com/office/drawing/2014/main" id="{BDAB9415-8ABB-4CEC-AD86-784B2694F916}"/>
+              </a:ext>
+            </a:extLst>
+          </p:cNvPr>
+          <p:cNvSpPr txBox="1"/>
+          <p:nvPr/>
+        </p:nvSpPr>
+        <p:spPr>
+          <a:xfrm>
+            <a:off x="6647432" y="5734043"/>
+            <a:ext cx="908146" cy="584775"/>
+          </a:xfrm>
+          <a:prstGeom prst="rect">
+            <a:avLst/>
+          </a:prstGeom>
+          <a:noFill/>
+        </p:spPr>
+        <p:txBody>
+          <a:bodyPr wrap="square" rtlCol="0">
+            <a:spAutoFit/>
+          </a:bodyPr>
+          <a:lstStyle/>
+          <a:p>
+            <a:r>
+              <a:rPr lang="fr-FR" sz="1600" dirty="0"/>
+              <a:t>Réseau Internet</a:t>
+            </a:r>
+          </a:p>
+        </p:txBody>
+      </p:sp>
+      <p:cxnSp>
+        <p:nvCxnSpPr>
+          <p:cNvPr id="211" name="Connecteur en angle 28">
+            <a:extLst>
+              <a:ext uri="{FF2B5EF4-FFF2-40B4-BE49-F238E27FC236}">
+                <a16:creationId xmlns:a16="http://schemas.microsoft.com/office/drawing/2014/main" id="{85B7DAC0-6ABE-411E-B60A-5DB13623DB03}"/>
+              </a:ext>
+            </a:extLst>
+          </p:cNvPr>
+          <p:cNvCxnSpPr>
+            <a:cxnSpLocks/>
+            <a:stCxn id="207" idx="3"/>
+            <a:endCxn id="209" idx="2"/>
+          </p:cNvCxnSpPr>
+          <p:nvPr/>
+        </p:nvCxnSpPr>
+        <p:spPr>
+          <a:xfrm>
+            <a:off x="4314305" y="5543078"/>
+            <a:ext cx="2024057" cy="508588"/>
+          </a:xfrm>
+          <a:prstGeom prst="bentConnector3">
+            <a:avLst>
+              <a:gd name="adj1" fmla="val 50000"/>
+            </a:avLst>
+          </a:prstGeom>
+          <a:ln w="9525" cap="flat" cmpd="sng" algn="ctr">
+            <a:solidFill>
+              <a:schemeClr val="dk1"/>
+            </a:solidFill>
+            <a:prstDash val="dash"/>
+            <a:round/>
+            <a:headEnd type="none" w="med" len="med"/>
+            <a:tailEnd type="none" w="med" len="med"/>
+          </a:ln>
+        </p:spPr>
+        <p:style>
+          <a:lnRef idx="0">
+            <a:scrgbClr r="0" g="0" b="0"/>
+          </a:lnRef>
+          <a:fillRef idx="0">
+            <a:scrgbClr r="0" g="0" b="0"/>
+          </a:fillRef>
+          <a:effectRef idx="0">
+            <a:scrgbClr r="0" g="0" b="0"/>
+          </a:effectRef>
+          <a:fontRef idx="minor">
+            <a:schemeClr val="tx1"/>
+          </a:fontRef>
+        </p:style>
+      </p:cxnSp>
+      <p:sp>
+        <p:nvSpPr>
+          <p:cNvPr id="212" name="ZoneTexte 211">
+            <a:extLst>
+              <a:ext uri="{FF2B5EF4-FFF2-40B4-BE49-F238E27FC236}">
+                <a16:creationId xmlns:a16="http://schemas.microsoft.com/office/drawing/2014/main" id="{CE053503-3926-406B-BAD3-50B23DDD85C6}"/>
+              </a:ext>
+            </a:extLst>
+          </p:cNvPr>
+          <p:cNvSpPr txBox="1"/>
+          <p:nvPr/>
+        </p:nvSpPr>
+        <p:spPr>
+          <a:xfrm>
+            <a:off x="4459947" y="6168043"/>
+            <a:ext cx="1633451" cy="553998"/>
+          </a:xfrm>
+          <a:prstGeom prst="rect">
+            <a:avLst/>
+          </a:prstGeom>
+          <a:noFill/>
+        </p:spPr>
+        <p:txBody>
+          <a:bodyPr wrap="square" rtlCol="0">
+            <a:spAutoFit/>
+          </a:bodyPr>
+          <a:lstStyle/>
+          <a:p>
+            <a:r>
+              <a:rPr lang="fr-FR" sz="1000" i="1" dirty="0">
+                <a:solidFill>
+                  <a:schemeClr val="bg1">
+                    <a:lumMod val="50000"/>
+                  </a:schemeClr>
+                </a:solidFill>
+              </a:rPr>
+              <a:t>Connexion au port : …. Sur l’adresse IP publique du router internet</a:t>
+            </a:r>
+          </a:p>
+        </p:txBody>
+      </p:sp>
+      <p:cxnSp>
+        <p:nvCxnSpPr>
+          <p:cNvPr id="214" name="Connecteur en angle 28">
+            <a:extLst>
+              <a:ext uri="{FF2B5EF4-FFF2-40B4-BE49-F238E27FC236}">
+                <a16:creationId xmlns:a16="http://schemas.microsoft.com/office/drawing/2014/main" id="{F3D59F6A-1879-4172-937E-BF721506158B}"/>
+              </a:ext>
+            </a:extLst>
+          </p:cNvPr>
+          <p:cNvCxnSpPr>
+            <a:cxnSpLocks/>
+            <a:stCxn id="208" idx="0"/>
+            <a:endCxn id="19" idx="0"/>
+          </p:cNvCxnSpPr>
+          <p:nvPr/>
+        </p:nvCxnSpPr>
+        <p:spPr>
+          <a:xfrm rot="16200000" flipV="1">
+            <a:off x="2469039" y="3861103"/>
+            <a:ext cx="2055696" cy="534783"/>
+          </a:xfrm>
+          <a:prstGeom prst="bentConnector5">
+            <a:avLst>
+              <a:gd name="adj1" fmla="val 23672"/>
+              <a:gd name="adj2" fmla="val 99466"/>
+              <a:gd name="adj3" fmla="val 61742"/>
+            </a:avLst>
+          </a:prstGeom>
+          <a:ln w="9525" cap="flat" cmpd="sng" algn="ctr">
+            <a:solidFill>
+              <a:schemeClr val="dk1"/>
+            </a:solidFill>
+            <a:prstDash val="dash"/>
+            <a:round/>
+            <a:headEnd type="none" w="med" len="med"/>
+            <a:tailEnd type="none" w="med" len="med"/>
+          </a:ln>
+        </p:spPr>
+        <p:style>
+          <a:lnRef idx="0">
+            <a:scrgbClr r="0" g="0" b="0"/>
+          </a:lnRef>
+          <a:fillRef idx="0">
+            <a:scrgbClr r="0" g="0" b="0"/>
+          </a:fillRef>
+          <a:effectRef idx="0">
+            <a:scrgbClr r="0" g="0" b="0"/>
+          </a:effectRef>
+          <a:fontRef idx="minor">
+            <a:schemeClr val="tx1"/>
+          </a:fontRef>
+        </p:style>
+      </p:cxnSp>
+      <p:sp>
+        <p:nvSpPr>
+          <p:cNvPr id="217" name="ZoneTexte 216">
+            <a:extLst>
+              <a:ext uri="{FF2B5EF4-FFF2-40B4-BE49-F238E27FC236}">
+                <a16:creationId xmlns:a16="http://schemas.microsoft.com/office/drawing/2014/main" id="{06B68DA6-694C-4A81-A0AF-C2D20D53D955}"/>
+              </a:ext>
+            </a:extLst>
+          </p:cNvPr>
+          <p:cNvSpPr txBox="1"/>
+          <p:nvPr/>
+        </p:nvSpPr>
+        <p:spPr>
+          <a:xfrm>
+            <a:off x="3229494" y="3783492"/>
+            <a:ext cx="1519843" cy="707886"/>
+          </a:xfrm>
+          <a:prstGeom prst="rect">
+            <a:avLst/>
+          </a:prstGeom>
+          <a:noFill/>
+        </p:spPr>
+        <p:txBody>
+          <a:bodyPr wrap="square" rtlCol="0">
+            <a:spAutoFit/>
+          </a:bodyPr>
+          <a:lstStyle/>
+          <a:p>
+            <a:r>
+              <a:rPr lang="fr-FR" sz="1000" i="1" dirty="0">
+                <a:solidFill>
+                  <a:schemeClr val="bg1">
+                    <a:lumMod val="50000"/>
+                  </a:schemeClr>
+                </a:solidFill>
+              </a:rPr>
+              <a:t>Redirection de la connexion entrante sur le port : …. Vers le serveur d’application </a:t>
+            </a:r>
+          </a:p>
+        </p:txBody>
+      </p:sp>
+      <p:sp>
+        <p:nvSpPr>
+          <p:cNvPr id="219" name="Rectangle 218">
+            <a:extLst>
+              <a:ext uri="{FF2B5EF4-FFF2-40B4-BE49-F238E27FC236}">
+                <a16:creationId xmlns:a16="http://schemas.microsoft.com/office/drawing/2014/main" id="{19833400-96A3-49D9-8204-17B07690B79D}"/>
+              </a:ext>
+            </a:extLst>
+          </p:cNvPr>
+          <p:cNvSpPr/>
+          <p:nvPr/>
+        </p:nvSpPr>
+        <p:spPr>
+          <a:xfrm>
+            <a:off x="2596070" y="2442206"/>
+            <a:ext cx="1375795" cy="261610"/>
+          </a:xfrm>
+          <a:prstGeom prst="rect">
+            <a:avLst/>
+          </a:prstGeom>
+        </p:spPr>
+        <p:style>
+          <a:lnRef idx="2">
+            <a:schemeClr val="accent3"/>
+          </a:lnRef>
+          <a:fillRef idx="1">
+            <a:schemeClr val="lt1"/>
+          </a:fillRef>
+          <a:effectRef idx="0">
+            <a:schemeClr val="accent3"/>
+          </a:effectRef>
+          <a:fontRef idx="minor">
+            <a:schemeClr val="dk1"/>
+          </a:fontRef>
+        </p:style>
+        <p:txBody>
+          <a:bodyPr rtlCol="0" anchor="ctr"/>
+          <a:lstStyle/>
+          <a:p>
+            <a:pPr algn="ctr"/>
+            <a:endParaRPr lang="fr-FR"/>
+          </a:p>
+        </p:txBody>
+      </p:sp>
+      <p:sp>
+        <p:nvSpPr>
+          <p:cNvPr id="220" name="Rectangle 219">
+            <a:extLst>
+              <a:ext uri="{FF2B5EF4-FFF2-40B4-BE49-F238E27FC236}">
+                <a16:creationId xmlns:a16="http://schemas.microsoft.com/office/drawing/2014/main" id="{DD4A18EF-2908-453C-8EB6-E86DCB429495}"/>
+              </a:ext>
+            </a:extLst>
+          </p:cNvPr>
+          <p:cNvSpPr/>
+          <p:nvPr/>
+        </p:nvSpPr>
+        <p:spPr>
+          <a:xfrm>
+            <a:off x="2596070" y="2830947"/>
+            <a:ext cx="1375795" cy="261610"/>
+          </a:xfrm>
+          <a:prstGeom prst="rect">
+            <a:avLst/>
+          </a:prstGeom>
+        </p:spPr>
+        <p:style>
+          <a:lnRef idx="2">
+            <a:schemeClr val="accent3"/>
+          </a:lnRef>
+          <a:fillRef idx="1">
+            <a:schemeClr val="lt1"/>
+          </a:fillRef>
+          <a:effectRef idx="0">
+            <a:schemeClr val="accent3"/>
+          </a:effectRef>
+          <a:fontRef idx="minor">
+            <a:schemeClr val="dk1"/>
+          </a:fontRef>
+        </p:style>
+        <p:txBody>
+          <a:bodyPr rtlCol="0" anchor="ctr"/>
+          <a:lstStyle/>
+          <a:p>
+            <a:pPr algn="ctr"/>
+            <a:endParaRPr lang="fr-FR"/>
+          </a:p>
+        </p:txBody>
+      </p:sp>
+      <p:sp>
+        <p:nvSpPr>
+          <p:cNvPr id="221" name="ZoneTexte 220">
+            <a:extLst>
+              <a:ext uri="{FF2B5EF4-FFF2-40B4-BE49-F238E27FC236}">
+                <a16:creationId xmlns:a16="http://schemas.microsoft.com/office/drawing/2014/main" id="{3D380395-9524-481D-92DE-710EF4830351}"/>
+              </a:ext>
+            </a:extLst>
+          </p:cNvPr>
+          <p:cNvSpPr txBox="1"/>
+          <p:nvPr/>
+        </p:nvSpPr>
+        <p:spPr>
+          <a:xfrm>
+            <a:off x="2729883" y="2442205"/>
+            <a:ext cx="1375795" cy="276999"/>
+          </a:xfrm>
+          <a:prstGeom prst="rect">
+            <a:avLst/>
+          </a:prstGeom>
+          <a:noFill/>
+        </p:spPr>
+        <p:txBody>
+          <a:bodyPr wrap="square" rtlCol="0">
+            <a:spAutoFit/>
+          </a:bodyPr>
+          <a:lstStyle/>
+          <a:p>
+            <a:r>
+              <a:rPr lang="fr-FR" sz="1200" i="1" dirty="0"/>
+              <a:t>Serveur MQTT</a:t>
+            </a:r>
+          </a:p>
+        </p:txBody>
+      </p:sp>
+      <p:sp>
+        <p:nvSpPr>
+          <p:cNvPr id="222" name="ZoneTexte 221">
+            <a:extLst>
+              <a:ext uri="{FF2B5EF4-FFF2-40B4-BE49-F238E27FC236}">
+                <a16:creationId xmlns:a16="http://schemas.microsoft.com/office/drawing/2014/main" id="{A4DF36A1-523C-477F-B7F7-9CB5008D9166}"/>
+              </a:ext>
+            </a:extLst>
+          </p:cNvPr>
+          <p:cNvSpPr txBox="1"/>
+          <p:nvPr/>
+        </p:nvSpPr>
+        <p:spPr>
+          <a:xfrm>
+            <a:off x="2547607" y="2829514"/>
+            <a:ext cx="1563488" cy="276999"/>
+          </a:xfrm>
+          <a:prstGeom prst="rect">
+            <a:avLst/>
+          </a:prstGeom>
+          <a:noFill/>
+        </p:spPr>
+        <p:txBody>
+          <a:bodyPr wrap="square" rtlCol="0">
+            <a:spAutoFit/>
+          </a:bodyPr>
+          <a:lstStyle/>
+          <a:p>
+            <a:r>
+              <a:rPr lang="fr-FR" sz="1200" i="1" dirty="0"/>
+              <a:t>Serveur d’application</a:t>
+            </a:r>
+          </a:p>
+        </p:txBody>
+      </p:sp>
+      <p:sp>
+        <p:nvSpPr>
+          <p:cNvPr id="228" name="ZoneTexte 227">
+            <a:extLst>
+              <a:ext uri="{FF2B5EF4-FFF2-40B4-BE49-F238E27FC236}">
+                <a16:creationId xmlns:a16="http://schemas.microsoft.com/office/drawing/2014/main" id="{A5A74645-2B82-4052-9F81-B6C4FEC53733}"/>
+              </a:ext>
+            </a:extLst>
+          </p:cNvPr>
+          <p:cNvSpPr txBox="1"/>
+          <p:nvPr/>
+        </p:nvSpPr>
+        <p:spPr>
+          <a:xfrm>
+            <a:off x="3134575" y="5453010"/>
+            <a:ext cx="1135400" cy="461665"/>
+          </a:xfrm>
+          <a:prstGeom prst="rect">
+            <a:avLst/>
+          </a:prstGeom>
+          <a:noFill/>
+        </p:spPr>
+        <p:txBody>
+          <a:bodyPr wrap="square" rtlCol="0">
+            <a:spAutoFit/>
+          </a:bodyPr>
+          <a:lstStyle/>
+          <a:p>
+            <a:r>
+              <a:rPr lang="fr-FR" sz="1200" dirty="0"/>
+              <a:t>IP:</a:t>
+            </a:r>
+          </a:p>
+          <a:p>
+            <a:r>
+              <a:rPr lang="fr-FR" sz="1200" dirty="0"/>
+              <a:t>Port:</a:t>
+            </a:r>
+          </a:p>
+        </p:txBody>
+      </p:sp>
+      <p:sp>
+        <p:nvSpPr>
+          <p:cNvPr id="229" name="ZoneTexte 228">
+            <a:extLst>
+              <a:ext uri="{FF2B5EF4-FFF2-40B4-BE49-F238E27FC236}">
+                <a16:creationId xmlns:a16="http://schemas.microsoft.com/office/drawing/2014/main" id="{ABD6C62D-5F9B-40CA-93B7-E6BC803A5680}"/>
+              </a:ext>
+            </a:extLst>
+          </p:cNvPr>
+          <p:cNvSpPr txBox="1"/>
+          <p:nvPr/>
+        </p:nvSpPr>
+        <p:spPr>
+          <a:xfrm>
+            <a:off x="1587731" y="6249798"/>
+            <a:ext cx="1247748" cy="553998"/>
+          </a:xfrm>
+          <a:prstGeom prst="rect">
+            <a:avLst/>
+          </a:prstGeom>
+          <a:noFill/>
+        </p:spPr>
+        <p:txBody>
+          <a:bodyPr wrap="square" rtlCol="0">
+            <a:spAutoFit/>
+          </a:bodyPr>
+          <a:lstStyle/>
+          <a:p>
+            <a:r>
+              <a:rPr lang="fr-FR" sz="1000" i="1" dirty="0">
+                <a:solidFill>
+                  <a:schemeClr val="bg1">
+                    <a:lumMod val="50000"/>
+                  </a:schemeClr>
+                </a:solidFill>
+              </a:rPr>
+              <a:t>Lecture directe de l’UID de la carte présentée</a:t>
+            </a:r>
           </a:p>
         </p:txBody>
       </p:sp>

</xml_diff>

<commit_message>
rapprt V2 + réorga git
</commit_message>
<xml_diff>
--- a/schemas_architecture_materielle.pptx
+++ b/schemas_architecture_materielle.pptx
@@ -242,7 +242,7 @@
           <a:p>
             <a:fld id="{967AB95B-CF6F-43FD-8F6D-069006E4CBA5}" type="datetimeFigureOut">
               <a:rPr lang="fr-FR" smtClean="0"/>
-              <a:t>20/03/2020</a:t>
+              <a:t>10/05/2020</a:t>
             </a:fld>
             <a:endParaRPr lang="fr-FR"/>
           </a:p>
@@ -410,7 +410,7 @@
           <a:p>
             <a:fld id="{967AB95B-CF6F-43FD-8F6D-069006E4CBA5}" type="datetimeFigureOut">
               <a:rPr lang="fr-FR" smtClean="0"/>
-              <a:t>20/03/2020</a:t>
+              <a:t>10/05/2020</a:t>
             </a:fld>
             <a:endParaRPr lang="fr-FR"/>
           </a:p>
@@ -588,7 +588,7 @@
           <a:p>
             <a:fld id="{967AB95B-CF6F-43FD-8F6D-069006E4CBA5}" type="datetimeFigureOut">
               <a:rPr lang="fr-FR" smtClean="0"/>
-              <a:t>20/03/2020</a:t>
+              <a:t>10/05/2020</a:t>
             </a:fld>
             <a:endParaRPr lang="fr-FR"/>
           </a:p>
@@ -756,7 +756,7 @@
           <a:p>
             <a:fld id="{967AB95B-CF6F-43FD-8F6D-069006E4CBA5}" type="datetimeFigureOut">
               <a:rPr lang="fr-FR" smtClean="0"/>
-              <a:t>20/03/2020</a:t>
+              <a:t>10/05/2020</a:t>
             </a:fld>
             <a:endParaRPr lang="fr-FR"/>
           </a:p>
@@ -1001,7 +1001,7 @@
           <a:p>
             <a:fld id="{967AB95B-CF6F-43FD-8F6D-069006E4CBA5}" type="datetimeFigureOut">
               <a:rPr lang="fr-FR" smtClean="0"/>
-              <a:t>20/03/2020</a:t>
+              <a:t>10/05/2020</a:t>
             </a:fld>
             <a:endParaRPr lang="fr-FR"/>
           </a:p>
@@ -1230,7 +1230,7 @@
           <a:p>
             <a:fld id="{967AB95B-CF6F-43FD-8F6D-069006E4CBA5}" type="datetimeFigureOut">
               <a:rPr lang="fr-FR" smtClean="0"/>
-              <a:t>20/03/2020</a:t>
+              <a:t>10/05/2020</a:t>
             </a:fld>
             <a:endParaRPr lang="fr-FR"/>
           </a:p>
@@ -1594,7 +1594,7 @@
           <a:p>
             <a:fld id="{967AB95B-CF6F-43FD-8F6D-069006E4CBA5}" type="datetimeFigureOut">
               <a:rPr lang="fr-FR" smtClean="0"/>
-              <a:t>20/03/2020</a:t>
+              <a:t>10/05/2020</a:t>
             </a:fld>
             <a:endParaRPr lang="fr-FR"/>
           </a:p>
@@ -1711,7 +1711,7 @@
           <a:p>
             <a:fld id="{967AB95B-CF6F-43FD-8F6D-069006E4CBA5}" type="datetimeFigureOut">
               <a:rPr lang="fr-FR" smtClean="0"/>
-              <a:t>20/03/2020</a:t>
+              <a:t>10/05/2020</a:t>
             </a:fld>
             <a:endParaRPr lang="fr-FR"/>
           </a:p>
@@ -1806,7 +1806,7 @@
           <a:p>
             <a:fld id="{967AB95B-CF6F-43FD-8F6D-069006E4CBA5}" type="datetimeFigureOut">
               <a:rPr lang="fr-FR" smtClean="0"/>
-              <a:t>20/03/2020</a:t>
+              <a:t>10/05/2020</a:t>
             </a:fld>
             <a:endParaRPr lang="fr-FR"/>
           </a:p>
@@ -2081,7 +2081,7 @@
           <a:p>
             <a:fld id="{967AB95B-CF6F-43FD-8F6D-069006E4CBA5}" type="datetimeFigureOut">
               <a:rPr lang="fr-FR" smtClean="0"/>
-              <a:t>20/03/2020</a:t>
+              <a:t>10/05/2020</a:t>
             </a:fld>
             <a:endParaRPr lang="fr-FR"/>
           </a:p>
@@ -2333,7 +2333,7 @@
           <a:p>
             <a:fld id="{967AB95B-CF6F-43FD-8F6D-069006E4CBA5}" type="datetimeFigureOut">
               <a:rPr lang="fr-FR" smtClean="0"/>
-              <a:t>20/03/2020</a:t>
+              <a:t>10/05/2020</a:t>
             </a:fld>
             <a:endParaRPr lang="fr-FR"/>
           </a:p>
@@ -2544,7 +2544,7 @@
           <a:p>
             <a:fld id="{967AB95B-CF6F-43FD-8F6D-069006E4CBA5}" type="datetimeFigureOut">
               <a:rPr lang="fr-FR" smtClean="0"/>
-              <a:t>20/03/2020</a:t>
+              <a:t>10/05/2020</a:t>
             </a:fld>
             <a:endParaRPr lang="fr-FR"/>
           </a:p>
@@ -5323,7 +5323,7 @@
         </p:nvSpPr>
         <p:spPr>
           <a:xfrm>
-            <a:off x="2481349" y="2080243"/>
+            <a:off x="2754010" y="3204555"/>
             <a:ext cx="1662545" cy="307777"/>
           </a:xfrm>
           <a:prstGeom prst="rect">
@@ -5389,18 +5389,21 @@
           <p:cNvPr id="22" name="Connecteur en angle 21"/>
           <p:cNvCxnSpPr>
             <a:cxnSpLocks/>
-            <a:stCxn id="6" idx="0"/>
-            <a:endCxn id="219" idx="1"/>
+            <a:stCxn id="6" idx="1"/>
+            <a:endCxn id="221" idx="0"/>
           </p:cNvCxnSpPr>
           <p:nvPr/>
         </p:nvCxnSpPr>
         <p:spPr>
-          <a:xfrm rot="5400000" flipH="1" flipV="1">
-            <a:off x="928230" y="2937411"/>
-            <a:ext cx="2032240" cy="1303440"/>
-          </a:xfrm>
-          <a:prstGeom prst="bentConnector2">
-            <a:avLst/>
+          <a:xfrm rot="10800000" flipH="1">
+            <a:off x="1072343" y="2442205"/>
+            <a:ext cx="2345438" cy="2645184"/>
+          </a:xfrm>
+          <a:prstGeom prst="bentConnector4">
+            <a:avLst>
+              <a:gd name="adj1" fmla="val -9747"/>
+              <a:gd name="adj2" fmla="val 108642"/>
+            </a:avLst>
           </a:prstGeom>
           <a:ln w="9525" cap="flat" cmpd="sng" algn="ctr">
             <a:solidFill>
@@ -6466,7 +6469,7 @@
         </p:nvSpPr>
         <p:spPr>
           <a:xfrm>
-            <a:off x="682557" y="1858068"/>
+            <a:off x="752302" y="1314973"/>
             <a:ext cx="1633451" cy="707886"/>
           </a:xfrm>
           <a:prstGeom prst="rect">
@@ -7295,6 +7298,188 @@
                 </a:solidFill>
               </a:rPr>
               <a:t>Lecture directe de l’UID de la carte présentée</a:t>
+            </a:r>
+          </a:p>
+        </p:txBody>
+      </p:sp>
+      <p:cxnSp>
+        <p:nvCxnSpPr>
+          <p:cNvPr id="66" name="Connecteur en angle 21">
+            <a:extLst>
+              <a:ext uri="{FF2B5EF4-FFF2-40B4-BE49-F238E27FC236}">
+                <a16:creationId xmlns:a16="http://schemas.microsoft.com/office/drawing/2014/main" id="{CD2C21E7-E887-4745-A1A5-FD8F5C6A9A33}"/>
+              </a:ext>
+            </a:extLst>
+          </p:cNvPr>
+          <p:cNvCxnSpPr>
+            <a:cxnSpLocks/>
+            <a:stCxn id="6" idx="0"/>
+            <a:endCxn id="219" idx="1"/>
+          </p:cNvCxnSpPr>
+          <p:nvPr/>
+        </p:nvCxnSpPr>
+        <p:spPr>
+          <a:xfrm rot="5400000" flipH="1" flipV="1">
+            <a:off x="928230" y="2937411"/>
+            <a:ext cx="2032240" cy="1303440"/>
+          </a:xfrm>
+          <a:prstGeom prst="bentConnector2">
+            <a:avLst/>
+          </a:prstGeom>
+          <a:ln w="9525" cap="flat" cmpd="sng" algn="ctr">
+            <a:solidFill>
+              <a:schemeClr val="dk1"/>
+            </a:solidFill>
+            <a:prstDash val="dash"/>
+            <a:round/>
+            <a:headEnd type="none" w="med" len="med"/>
+            <a:tailEnd type="none" w="med" len="med"/>
+          </a:ln>
+        </p:spPr>
+        <p:style>
+          <a:lnRef idx="0">
+            <a:scrgbClr r="0" g="0" b="0"/>
+          </a:lnRef>
+          <a:fillRef idx="0">
+            <a:scrgbClr r="0" g="0" b="0"/>
+          </a:fillRef>
+          <a:effectRef idx="0">
+            <a:scrgbClr r="0" g="0" b="0"/>
+          </a:effectRef>
+          <a:fontRef idx="minor">
+            <a:schemeClr val="tx1"/>
+          </a:fontRef>
+        </p:style>
+      </p:cxnSp>
+      <p:sp>
+        <p:nvSpPr>
+          <p:cNvPr id="72" name="ZoneTexte 71">
+            <a:extLst>
+              <a:ext uri="{FF2B5EF4-FFF2-40B4-BE49-F238E27FC236}">
+                <a16:creationId xmlns:a16="http://schemas.microsoft.com/office/drawing/2014/main" id="{CB264BBA-67FB-4348-896C-D4B387358458}"/>
+              </a:ext>
+            </a:extLst>
+          </p:cNvPr>
+          <p:cNvSpPr txBox="1"/>
+          <p:nvPr/>
+        </p:nvSpPr>
+        <p:spPr>
+          <a:xfrm>
+            <a:off x="1250539" y="2575571"/>
+            <a:ext cx="919084" cy="1169551"/>
+          </a:xfrm>
+          <a:prstGeom prst="rect">
+            <a:avLst/>
+          </a:prstGeom>
+          <a:noFill/>
+        </p:spPr>
+        <p:txBody>
+          <a:bodyPr wrap="square" rtlCol="0">
+            <a:spAutoFit/>
+          </a:bodyPr>
+          <a:lstStyle/>
+          <a:p>
+            <a:r>
+              <a:rPr lang="fr-FR" sz="1000" i="1" dirty="0">
+                <a:solidFill>
+                  <a:schemeClr val="bg1">
+                    <a:lumMod val="50000"/>
+                  </a:schemeClr>
+                </a:solidFill>
+              </a:rPr>
+              <a:t>Message transmis vers le serveur MQTT</a:t>
+            </a:r>
+          </a:p>
+          <a:p>
+            <a:r>
+              <a:rPr lang="fr-FR" sz="1000" i="1" dirty="0">
+                <a:solidFill>
+                  <a:schemeClr val="bg1">
+                    <a:lumMod val="50000"/>
+                  </a:schemeClr>
+                </a:solidFill>
+              </a:rPr>
+              <a:t>{Pub/</a:t>
+            </a:r>
+            <a:r>
+              <a:rPr lang="fr-FR" sz="1000" i="1" dirty="0" err="1">
+                <a:solidFill>
+                  <a:schemeClr val="bg1">
+                    <a:lumMod val="50000"/>
+                  </a:schemeClr>
+                </a:solidFill>
+              </a:rPr>
+              <a:t>Sub</a:t>
+            </a:r>
+            <a:r>
+              <a:rPr lang="fr-FR" sz="1000" i="1" dirty="0">
+                <a:solidFill>
+                  <a:schemeClr val="bg1">
+                    <a:lumMod val="50000"/>
+                  </a:schemeClr>
+                </a:solidFill>
+              </a:rPr>
+              <a:t>: </a:t>
+            </a:r>
+            <a:r>
+              <a:rPr lang="fr-FR" sz="1000" i="1" dirty="0" err="1">
+                <a:solidFill>
+                  <a:schemeClr val="bg1">
+                    <a:lumMod val="50000"/>
+                  </a:schemeClr>
+                </a:solidFill>
+              </a:rPr>
+              <a:t>guizard</a:t>
+            </a:r>
+            <a:r>
+              <a:rPr lang="fr-FR" sz="1000" i="1" dirty="0">
+                <a:solidFill>
+                  <a:schemeClr val="bg1">
+                    <a:lumMod val="50000"/>
+                  </a:schemeClr>
+                </a:solidFill>
+              </a:rPr>
+              <a:t>/</a:t>
+            </a:r>
+            <a:r>
+              <a:rPr lang="fr-FR" sz="1000" i="1" dirty="0" err="1">
+                <a:solidFill>
+                  <a:schemeClr val="bg1">
+                    <a:lumMod val="50000"/>
+                  </a:schemeClr>
+                </a:solidFill>
+              </a:rPr>
+              <a:t>hodor</a:t>
+            </a:r>
+            <a:r>
+              <a:rPr lang="fr-FR" sz="1000" i="1" dirty="0">
+                <a:solidFill>
+                  <a:schemeClr val="bg1">
+                    <a:lumMod val="50000"/>
+                  </a:schemeClr>
+                </a:solidFill>
+              </a:rPr>
+              <a:t>/</a:t>
+            </a:r>
+            <a:r>
+              <a:rPr lang="fr-FR" sz="1000" i="1" dirty="0" err="1">
+                <a:solidFill>
+                  <a:schemeClr val="bg1">
+                    <a:lumMod val="50000"/>
+                  </a:schemeClr>
+                </a:solidFill>
+              </a:rPr>
+              <a:t>doorStatus</a:t>
+            </a:r>
+            <a:r>
+              <a:rPr lang="fr-FR" sz="1000" i="1" dirty="0">
+                <a:solidFill>
+                  <a:schemeClr val="bg1">
+                    <a:lumMod val="50000"/>
+                  </a:schemeClr>
+                </a:solidFill>
+              </a:rPr>
+              <a:t>}</a:t>
             </a:r>
           </a:p>
         </p:txBody>

</xml_diff>